<commit_message>
Examples of NGRX parts
</commit_message>
<xml_diff>
--- a/Reactive State Management.pptx
+++ b/Reactive State Management.pptx
@@ -15,8 +15,12 @@
     <p:sldId id="276" r:id="rId9"/>
     <p:sldId id="275" r:id="rId10"/>
     <p:sldId id="274" r:id="rId11"/>
-    <p:sldId id="281" r:id="rId12"/>
-    <p:sldId id="272" r:id="rId13"/>
+    <p:sldId id="282" r:id="rId12"/>
+    <p:sldId id="283" r:id="rId13"/>
+    <p:sldId id="284" r:id="rId14"/>
+    <p:sldId id="285" r:id="rId15"/>
+    <p:sldId id="281" r:id="rId16"/>
+    <p:sldId id="272" r:id="rId17"/>
   </p:sldIdLst>
   <p:sldSz cx="12192000" cy="6858000"/>
   <p:notesSz cx="6858000" cy="9144000"/>
@@ -3512,7 +3516,7 @@
           <a:p>
             <a:fld id="{75934EED-E7C0-439C-9F42-70CEC4ABC1D3}" type="datetimeFigureOut">
               <a:rPr lang="nl-NL" smtClean="0"/>
-              <a:t>16-11-2020</a:t>
+              <a:t>19-11-2020</a:t>
             </a:fld>
             <a:endParaRPr lang="nl-NL"/>
           </a:p>
@@ -3824,7 +3828,7 @@
           <a:p>
             <a:fld id="{75934EED-E7C0-439C-9F42-70CEC4ABC1D3}" type="datetimeFigureOut">
               <a:rPr lang="nl-NL" smtClean="0"/>
-              <a:t>16-11-2020</a:t>
+              <a:t>19-11-2020</a:t>
             </a:fld>
             <a:endParaRPr lang="nl-NL"/>
           </a:p>
@@ -4046,7 +4050,7 @@
           <a:p>
             <a:fld id="{75934EED-E7C0-439C-9F42-70CEC4ABC1D3}" type="datetimeFigureOut">
               <a:rPr lang="nl-NL" smtClean="0"/>
-              <a:t>16-11-2020</a:t>
+              <a:t>19-11-2020</a:t>
             </a:fld>
             <a:endParaRPr lang="nl-NL"/>
           </a:p>
@@ -4337,7 +4341,7 @@
           <a:p>
             <a:fld id="{75934EED-E7C0-439C-9F42-70CEC4ABC1D3}" type="datetimeFigureOut">
               <a:rPr lang="nl-NL" smtClean="0"/>
-              <a:t>16-11-2020</a:t>
+              <a:t>19-11-2020</a:t>
             </a:fld>
             <a:endParaRPr lang="nl-NL"/>
           </a:p>
@@ -4791,7 +4795,7 @@
           <a:p>
             <a:fld id="{75934EED-E7C0-439C-9F42-70CEC4ABC1D3}" type="datetimeFigureOut">
               <a:rPr lang="nl-NL" smtClean="0"/>
-              <a:t>16-11-2020</a:t>
+              <a:t>19-11-2020</a:t>
             </a:fld>
             <a:endParaRPr lang="nl-NL"/>
           </a:p>
@@ -5367,7 +5371,7 @@
           <a:p>
             <a:fld id="{75934EED-E7C0-439C-9F42-70CEC4ABC1D3}" type="datetimeFigureOut">
               <a:rPr lang="nl-NL" smtClean="0"/>
-              <a:t>16-11-2020</a:t>
+              <a:t>19-11-2020</a:t>
             </a:fld>
             <a:endParaRPr lang="nl-NL"/>
           </a:p>
@@ -6219,7 +6223,7 @@
           <a:p>
             <a:fld id="{75934EED-E7C0-439C-9F42-70CEC4ABC1D3}" type="datetimeFigureOut">
               <a:rPr lang="nl-NL" smtClean="0"/>
-              <a:t>16-11-2020</a:t>
+              <a:t>19-11-2020</a:t>
             </a:fld>
             <a:endParaRPr lang="nl-NL"/>
           </a:p>
@@ -6424,7 +6428,7 @@
           <a:p>
             <a:fld id="{75934EED-E7C0-439C-9F42-70CEC4ABC1D3}" type="datetimeFigureOut">
               <a:rPr lang="nl-NL" smtClean="0"/>
-              <a:t>16-11-2020</a:t>
+              <a:t>19-11-2020</a:t>
             </a:fld>
             <a:endParaRPr lang="nl-NL"/>
           </a:p>
@@ -6638,7 +6642,7 @@
           <a:p>
             <a:fld id="{75934EED-E7C0-439C-9F42-70CEC4ABC1D3}" type="datetimeFigureOut">
               <a:rPr lang="nl-NL" smtClean="0"/>
-              <a:t>16-11-2020</a:t>
+              <a:t>19-11-2020</a:t>
             </a:fld>
             <a:endParaRPr lang="nl-NL"/>
           </a:p>
@@ -6814,7 +6818,7 @@
           <a:p>
             <a:fld id="{75934EED-E7C0-439C-9F42-70CEC4ABC1D3}" type="datetimeFigureOut">
               <a:rPr lang="nl-NL" smtClean="0"/>
-              <a:t>16-11-2020</a:t>
+              <a:t>19-11-2020</a:t>
             </a:fld>
             <a:endParaRPr lang="nl-NL"/>
           </a:p>
@@ -7019,7 +7023,7 @@
           <a:p>
             <a:fld id="{75934EED-E7C0-439C-9F42-70CEC4ABC1D3}" type="datetimeFigureOut">
               <a:rPr lang="nl-NL" smtClean="0"/>
-              <a:t>16-11-2020</a:t>
+              <a:t>19-11-2020</a:t>
             </a:fld>
             <a:endParaRPr lang="nl-NL"/>
           </a:p>
@@ -7299,7 +7303,7 @@
           <a:p>
             <a:fld id="{75934EED-E7C0-439C-9F42-70CEC4ABC1D3}" type="datetimeFigureOut">
               <a:rPr lang="nl-NL" smtClean="0"/>
-              <a:t>16-11-2020</a:t>
+              <a:t>19-11-2020</a:t>
             </a:fld>
             <a:endParaRPr lang="nl-NL"/>
           </a:p>
@@ -7566,7 +7570,7 @@
           <a:p>
             <a:fld id="{75934EED-E7C0-439C-9F42-70CEC4ABC1D3}" type="datetimeFigureOut">
               <a:rPr lang="nl-NL" smtClean="0"/>
-              <a:t>16-11-2020</a:t>
+              <a:t>19-11-2020</a:t>
             </a:fld>
             <a:endParaRPr lang="nl-NL"/>
           </a:p>
@@ -7981,7 +7985,7 @@
           <a:p>
             <a:fld id="{75934EED-E7C0-439C-9F42-70CEC4ABC1D3}" type="datetimeFigureOut">
               <a:rPr lang="nl-NL" smtClean="0"/>
-              <a:t>16-11-2020</a:t>
+              <a:t>19-11-2020</a:t>
             </a:fld>
             <a:endParaRPr lang="nl-NL"/>
           </a:p>
@@ -8129,7 +8133,7 @@
           <a:p>
             <a:fld id="{75934EED-E7C0-439C-9F42-70CEC4ABC1D3}" type="datetimeFigureOut">
               <a:rPr lang="nl-NL" smtClean="0"/>
-              <a:t>16-11-2020</a:t>
+              <a:t>19-11-2020</a:t>
             </a:fld>
             <a:endParaRPr lang="nl-NL"/>
           </a:p>
@@ -8254,7 +8258,7 @@
           <a:p>
             <a:fld id="{75934EED-E7C0-439C-9F42-70CEC4ABC1D3}" type="datetimeFigureOut">
               <a:rPr lang="nl-NL" smtClean="0"/>
-              <a:t>16-11-2020</a:t>
+              <a:t>19-11-2020</a:t>
             </a:fld>
             <a:endParaRPr lang="nl-NL"/>
           </a:p>
@@ -8533,7 +8537,7 @@
           <a:p>
             <a:fld id="{75934EED-E7C0-439C-9F42-70CEC4ABC1D3}" type="datetimeFigureOut">
               <a:rPr lang="nl-NL" smtClean="0"/>
-              <a:t>16-11-2020</a:t>
+              <a:t>19-11-2020</a:t>
             </a:fld>
             <a:endParaRPr lang="nl-NL"/>
           </a:p>
@@ -8845,7 +8849,7 @@
           <a:p>
             <a:fld id="{75934EED-E7C0-439C-9F42-70CEC4ABC1D3}" type="datetimeFigureOut">
               <a:rPr lang="nl-NL" smtClean="0"/>
-              <a:t>16-11-2020</a:t>
+              <a:t>19-11-2020</a:t>
             </a:fld>
             <a:endParaRPr lang="nl-NL"/>
           </a:p>
@@ -9098,7 +9102,7 @@
           <a:p>
             <a:fld id="{75934EED-E7C0-439C-9F42-70CEC4ABC1D3}" type="datetimeFigureOut">
               <a:rPr lang="nl-NL" smtClean="0"/>
-              <a:t>16-11-2020</a:t>
+              <a:t>19-11-2020</a:t>
             </a:fld>
             <a:endParaRPr lang="nl-NL"/>
           </a:p>
@@ -10653,6 +10657,2353 @@
           <a:p>
             <a:r>
               <a:rPr lang="en-US" dirty="0"/>
+              <a:t>NGRX - Action</a:t>
+            </a:r>
+            <a:endParaRPr lang="nl-NL" dirty="0"/>
+          </a:p>
+        </p:txBody>
+      </p:sp>
+      <p:sp>
+        <p:nvSpPr>
+          <p:cNvPr id="4" name="Rectangle 3">
+            <a:extLst>
+              <a:ext uri="{FF2B5EF4-FFF2-40B4-BE49-F238E27FC236}">
+                <a16:creationId xmlns:a16="http://schemas.microsoft.com/office/drawing/2014/main" id="{64BC618A-9685-431A-95C8-1B50C74DF841}"/>
+              </a:ext>
+            </a:extLst>
+          </p:cNvPr>
+          <p:cNvSpPr/>
+          <p:nvPr/>
+        </p:nvSpPr>
+        <p:spPr>
+          <a:xfrm>
+            <a:off x="1437167" y="2214000"/>
+            <a:ext cx="9317665" cy="1754326"/>
+          </a:xfrm>
+          <a:prstGeom prst="rect">
+            <a:avLst/>
+          </a:prstGeom>
+          <a:solidFill>
+            <a:schemeClr val="tx1"/>
+          </a:solidFill>
+        </p:spPr>
+        <p:txBody>
+          <a:bodyPr wrap="square">
+            <a:spAutoFit/>
+          </a:bodyPr>
+          <a:lstStyle/>
+          <a:p>
+            <a:r>
+              <a:rPr lang="en-US" dirty="0">
+                <a:solidFill>
+                  <a:srgbClr val="C586C0"/>
+                </a:solidFill>
+                <a:latin typeface="Consolas" panose="020B0609020204030204" pitchFamily="49" charset="0"/>
+              </a:rPr>
+              <a:t>export</a:t>
+            </a:r>
+            <a:r>
+              <a:rPr lang="en-US" dirty="0">
+                <a:solidFill>
+                  <a:srgbClr val="D4D4D4"/>
+                </a:solidFill>
+                <a:latin typeface="Consolas" panose="020B0609020204030204" pitchFamily="49" charset="0"/>
+              </a:rPr>
+              <a:t> </a:t>
+            </a:r>
+            <a:r>
+              <a:rPr lang="en-US" dirty="0">
+                <a:solidFill>
+                  <a:srgbClr val="569CD6"/>
+                </a:solidFill>
+                <a:latin typeface="Consolas" panose="020B0609020204030204" pitchFamily="49" charset="0"/>
+              </a:rPr>
+              <a:t>const</a:t>
+            </a:r>
+            <a:r>
+              <a:rPr lang="en-US" dirty="0">
+                <a:solidFill>
+                  <a:srgbClr val="D4D4D4"/>
+                </a:solidFill>
+                <a:latin typeface="Consolas" panose="020B0609020204030204" pitchFamily="49" charset="0"/>
+              </a:rPr>
+              <a:t> </a:t>
+            </a:r>
+            <a:r>
+              <a:rPr lang="en-US" dirty="0" err="1">
+                <a:solidFill>
+                  <a:srgbClr val="4FC1FF"/>
+                </a:solidFill>
+                <a:latin typeface="Consolas" panose="020B0609020204030204" pitchFamily="49" charset="0"/>
+              </a:rPr>
+              <a:t>requestProducts</a:t>
+            </a:r>
+            <a:r>
+              <a:rPr lang="en-US" dirty="0">
+                <a:solidFill>
+                  <a:srgbClr val="D4D4D4"/>
+                </a:solidFill>
+                <a:latin typeface="Consolas" panose="020B0609020204030204" pitchFamily="49" charset="0"/>
+              </a:rPr>
+              <a:t> = </a:t>
+            </a:r>
+            <a:r>
+              <a:rPr lang="en-US" dirty="0" err="1">
+                <a:solidFill>
+                  <a:srgbClr val="DCDCAA"/>
+                </a:solidFill>
+                <a:latin typeface="Consolas" panose="020B0609020204030204" pitchFamily="49" charset="0"/>
+              </a:rPr>
+              <a:t>createAction</a:t>
+            </a:r>
+            <a:r>
+              <a:rPr lang="en-US" dirty="0">
+                <a:solidFill>
+                  <a:srgbClr val="D4D4D4"/>
+                </a:solidFill>
+                <a:latin typeface="Consolas" panose="020B0609020204030204" pitchFamily="49" charset="0"/>
+              </a:rPr>
+              <a:t>(</a:t>
+            </a:r>
+            <a:r>
+              <a:rPr lang="en-US" dirty="0">
+                <a:solidFill>
+                  <a:srgbClr val="CE9178"/>
+                </a:solidFill>
+                <a:latin typeface="Consolas" panose="020B0609020204030204" pitchFamily="49" charset="0"/>
+              </a:rPr>
+              <a:t>'[Shop] Request products'</a:t>
+            </a:r>
+            <a:r>
+              <a:rPr lang="en-US" dirty="0">
+                <a:solidFill>
+                  <a:srgbClr val="D4D4D4"/>
+                </a:solidFill>
+                <a:latin typeface="Consolas" panose="020B0609020204030204" pitchFamily="49" charset="0"/>
+              </a:rPr>
+              <a:t>);</a:t>
+            </a:r>
+          </a:p>
+          <a:p>
+            <a:br>
+              <a:rPr lang="en-US" dirty="0">
+                <a:solidFill>
+                  <a:srgbClr val="D4D4D4"/>
+                </a:solidFill>
+                <a:latin typeface="Consolas" panose="020B0609020204030204" pitchFamily="49" charset="0"/>
+              </a:rPr>
+            </a:br>
+            <a:r>
+              <a:rPr lang="en-US" dirty="0">
+                <a:solidFill>
+                  <a:srgbClr val="C586C0"/>
+                </a:solidFill>
+                <a:latin typeface="Consolas" panose="020B0609020204030204" pitchFamily="49" charset="0"/>
+              </a:rPr>
+              <a:t>export</a:t>
+            </a:r>
+            <a:r>
+              <a:rPr lang="en-US" dirty="0">
+                <a:solidFill>
+                  <a:srgbClr val="D4D4D4"/>
+                </a:solidFill>
+                <a:latin typeface="Consolas" panose="020B0609020204030204" pitchFamily="49" charset="0"/>
+              </a:rPr>
+              <a:t> </a:t>
+            </a:r>
+            <a:r>
+              <a:rPr lang="en-US" dirty="0">
+                <a:solidFill>
+                  <a:srgbClr val="569CD6"/>
+                </a:solidFill>
+                <a:latin typeface="Consolas" panose="020B0609020204030204" pitchFamily="49" charset="0"/>
+              </a:rPr>
+              <a:t>const</a:t>
+            </a:r>
+            <a:r>
+              <a:rPr lang="en-US" dirty="0">
+                <a:solidFill>
+                  <a:srgbClr val="D4D4D4"/>
+                </a:solidFill>
+                <a:latin typeface="Consolas" panose="020B0609020204030204" pitchFamily="49" charset="0"/>
+              </a:rPr>
+              <a:t> </a:t>
+            </a:r>
+            <a:r>
+              <a:rPr lang="en-US" dirty="0" err="1">
+                <a:solidFill>
+                  <a:srgbClr val="4FC1FF"/>
+                </a:solidFill>
+                <a:latin typeface="Consolas" panose="020B0609020204030204" pitchFamily="49" charset="0"/>
+              </a:rPr>
+              <a:t>requestProductsSuccess</a:t>
+            </a:r>
+            <a:r>
+              <a:rPr lang="en-US" dirty="0">
+                <a:solidFill>
+                  <a:srgbClr val="D4D4D4"/>
+                </a:solidFill>
+                <a:latin typeface="Consolas" panose="020B0609020204030204" pitchFamily="49" charset="0"/>
+              </a:rPr>
+              <a:t> = </a:t>
+            </a:r>
+            <a:r>
+              <a:rPr lang="en-US" dirty="0" err="1">
+                <a:solidFill>
+                  <a:srgbClr val="DCDCAA"/>
+                </a:solidFill>
+                <a:latin typeface="Consolas" panose="020B0609020204030204" pitchFamily="49" charset="0"/>
+              </a:rPr>
+              <a:t>createAction</a:t>
+            </a:r>
+            <a:r>
+              <a:rPr lang="en-US" dirty="0">
+                <a:solidFill>
+                  <a:srgbClr val="D4D4D4"/>
+                </a:solidFill>
+                <a:latin typeface="Consolas" panose="020B0609020204030204" pitchFamily="49" charset="0"/>
+              </a:rPr>
+              <a:t>(</a:t>
+            </a:r>
+          </a:p>
+          <a:p>
+            <a:r>
+              <a:rPr lang="en-US" dirty="0">
+                <a:solidFill>
+                  <a:srgbClr val="D4D4D4"/>
+                </a:solidFill>
+                <a:latin typeface="Consolas" panose="020B0609020204030204" pitchFamily="49" charset="0"/>
+              </a:rPr>
+              <a:t>  </a:t>
+            </a:r>
+            <a:r>
+              <a:rPr lang="en-US" dirty="0">
+                <a:solidFill>
+                  <a:srgbClr val="CE9178"/>
+                </a:solidFill>
+                <a:latin typeface="Consolas" panose="020B0609020204030204" pitchFamily="49" charset="0"/>
+              </a:rPr>
+              <a:t>'[Shop] Request products success'</a:t>
+            </a:r>
+            <a:r>
+              <a:rPr lang="en-US" dirty="0">
+                <a:solidFill>
+                  <a:srgbClr val="D4D4D4"/>
+                </a:solidFill>
+                <a:latin typeface="Consolas" panose="020B0609020204030204" pitchFamily="49" charset="0"/>
+              </a:rPr>
+              <a:t>,</a:t>
+            </a:r>
+          </a:p>
+          <a:p>
+            <a:r>
+              <a:rPr lang="en-US" dirty="0">
+                <a:solidFill>
+                  <a:srgbClr val="D4D4D4"/>
+                </a:solidFill>
+                <a:latin typeface="Consolas" panose="020B0609020204030204" pitchFamily="49" charset="0"/>
+              </a:rPr>
+              <a:t>  </a:t>
+            </a:r>
+            <a:r>
+              <a:rPr lang="en-US" dirty="0">
+                <a:solidFill>
+                  <a:srgbClr val="DCDCAA"/>
+                </a:solidFill>
+                <a:latin typeface="Consolas" panose="020B0609020204030204" pitchFamily="49" charset="0"/>
+              </a:rPr>
+              <a:t>props</a:t>
+            </a:r>
+            <a:r>
+              <a:rPr lang="en-US" dirty="0">
+                <a:solidFill>
+                  <a:srgbClr val="D4D4D4"/>
+                </a:solidFill>
+                <a:latin typeface="Consolas" panose="020B0609020204030204" pitchFamily="49" charset="0"/>
+              </a:rPr>
+              <a:t>&lt;{ </a:t>
+            </a:r>
+            <a:r>
+              <a:rPr lang="en-US" dirty="0">
+                <a:solidFill>
+                  <a:srgbClr val="9CDCFE"/>
+                </a:solidFill>
+                <a:latin typeface="Consolas" panose="020B0609020204030204" pitchFamily="49" charset="0"/>
+              </a:rPr>
+              <a:t>products</a:t>
+            </a:r>
+            <a:r>
+              <a:rPr lang="en-US" dirty="0">
+                <a:solidFill>
+                  <a:srgbClr val="D4D4D4"/>
+                </a:solidFill>
+                <a:latin typeface="Consolas" panose="020B0609020204030204" pitchFamily="49" charset="0"/>
+              </a:rPr>
+              <a:t>: </a:t>
+            </a:r>
+            <a:r>
+              <a:rPr lang="en-US" dirty="0">
+                <a:solidFill>
+                  <a:srgbClr val="4EC9B0"/>
+                </a:solidFill>
+                <a:latin typeface="Consolas" panose="020B0609020204030204" pitchFamily="49" charset="0"/>
+              </a:rPr>
+              <a:t>Product</a:t>
+            </a:r>
+            <a:r>
+              <a:rPr lang="en-US" dirty="0">
+                <a:solidFill>
+                  <a:srgbClr val="D4D4D4"/>
+                </a:solidFill>
+                <a:latin typeface="Consolas" panose="020B0609020204030204" pitchFamily="49" charset="0"/>
+              </a:rPr>
+              <a:t>[] }&gt;()</a:t>
+            </a:r>
+          </a:p>
+          <a:p>
+            <a:r>
+              <a:rPr lang="en-US" dirty="0">
+                <a:solidFill>
+                  <a:srgbClr val="D4D4D4"/>
+                </a:solidFill>
+                <a:latin typeface="Consolas" panose="020B0609020204030204" pitchFamily="49" charset="0"/>
+              </a:rPr>
+              <a:t>);</a:t>
+            </a:r>
+            <a:endParaRPr lang="en-US" b="0" dirty="0">
+              <a:solidFill>
+                <a:srgbClr val="D4D4D4"/>
+              </a:solidFill>
+              <a:effectLst/>
+              <a:latin typeface="Consolas" panose="020B0609020204030204" pitchFamily="49" charset="0"/>
+            </a:endParaRPr>
+          </a:p>
+        </p:txBody>
+      </p:sp>
+    </p:spTree>
+    <p:extLst>
+      <p:ext uri="{BB962C8B-B14F-4D97-AF65-F5344CB8AC3E}">
+        <p14:creationId xmlns:p14="http://schemas.microsoft.com/office/powerpoint/2010/main" val="3555560239"/>
+      </p:ext>
+    </p:extLst>
+  </p:cSld>
+  <p:clrMapOvr>
+    <a:masterClrMapping/>
+  </p:clrMapOvr>
+</p:sld>
+</file>
+
+<file path=ppt/slides/slide12.xml><?xml version="1.0" encoding="utf-8"?>
+<p:sld xmlns:a="http://schemas.openxmlformats.org/drawingml/2006/main" xmlns:r="http://schemas.openxmlformats.org/officeDocument/2006/relationships" xmlns:p="http://schemas.openxmlformats.org/presentationml/2006/main">
+  <p:cSld>
+    <p:spTree>
+      <p:nvGrpSpPr>
+        <p:cNvPr id="1" name=""/>
+        <p:cNvGrpSpPr/>
+        <p:nvPr/>
+      </p:nvGrpSpPr>
+      <p:grpSpPr>
+        <a:xfrm>
+          <a:off x="0" y="0"/>
+          <a:ext cx="0" cy="0"/>
+          <a:chOff x="0" y="0"/>
+          <a:chExt cx="0" cy="0"/>
+        </a:xfrm>
+      </p:grpSpPr>
+      <p:sp>
+        <p:nvSpPr>
+          <p:cNvPr id="2" name="Title 1">
+            <a:extLst>
+              <a:ext uri="{FF2B5EF4-FFF2-40B4-BE49-F238E27FC236}">
+                <a16:creationId xmlns:a16="http://schemas.microsoft.com/office/drawing/2014/main" id="{58A75D02-8D99-4750-B95C-655E0DA90887}"/>
+              </a:ext>
+            </a:extLst>
+          </p:cNvPr>
+          <p:cNvSpPr>
+            <a:spLocks noGrp="1"/>
+          </p:cNvSpPr>
+          <p:nvPr>
+            <p:ph type="title"/>
+          </p:nvPr>
+        </p:nvSpPr>
+        <p:spPr/>
+        <p:txBody>
+          <a:bodyPr/>
+          <a:lstStyle/>
+          <a:p>
+            <a:r>
+              <a:rPr lang="en-US" dirty="0"/>
+              <a:t>NGRX - EFFECTS</a:t>
+            </a:r>
+            <a:endParaRPr lang="nl-NL" dirty="0"/>
+          </a:p>
+        </p:txBody>
+      </p:sp>
+      <p:sp>
+        <p:nvSpPr>
+          <p:cNvPr id="3" name="Rectangle 2">
+            <a:extLst>
+              <a:ext uri="{FF2B5EF4-FFF2-40B4-BE49-F238E27FC236}">
+                <a16:creationId xmlns:a16="http://schemas.microsoft.com/office/drawing/2014/main" id="{CB5323DB-F5ED-448C-9DDF-21C8B304251C}"/>
+              </a:ext>
+            </a:extLst>
+          </p:cNvPr>
+          <p:cNvSpPr/>
+          <p:nvPr/>
+        </p:nvSpPr>
+        <p:spPr>
+          <a:xfrm>
+            <a:off x="1437600" y="2214000"/>
+            <a:ext cx="9316800" cy="3693319"/>
+          </a:xfrm>
+          <a:prstGeom prst="rect">
+            <a:avLst/>
+          </a:prstGeom>
+          <a:solidFill>
+            <a:schemeClr val="tx1"/>
+          </a:solidFill>
+        </p:spPr>
+        <p:txBody>
+          <a:bodyPr wrap="square">
+            <a:spAutoFit/>
+          </a:bodyPr>
+          <a:lstStyle/>
+          <a:p>
+            <a:r>
+              <a:rPr lang="nl-NL" dirty="0">
+                <a:solidFill>
+                  <a:srgbClr val="D4D4D4"/>
+                </a:solidFill>
+                <a:latin typeface="Consolas" panose="020B0609020204030204" pitchFamily="49" charset="0"/>
+              </a:rPr>
+              <a:t>  </a:t>
+            </a:r>
+            <a:r>
+              <a:rPr lang="nl-NL" dirty="0" err="1">
+                <a:solidFill>
+                  <a:srgbClr val="9CDCFE"/>
+                </a:solidFill>
+                <a:latin typeface="Consolas" panose="020B0609020204030204" pitchFamily="49" charset="0"/>
+              </a:rPr>
+              <a:t>requestProducts</a:t>
+            </a:r>
+            <a:r>
+              <a:rPr lang="nl-NL" dirty="0">
+                <a:solidFill>
+                  <a:srgbClr val="9CDCFE"/>
+                </a:solidFill>
+                <a:latin typeface="Consolas" panose="020B0609020204030204" pitchFamily="49" charset="0"/>
+              </a:rPr>
+              <a:t>$</a:t>
+            </a:r>
+            <a:r>
+              <a:rPr lang="nl-NL" dirty="0">
+                <a:solidFill>
+                  <a:srgbClr val="D4D4D4"/>
+                </a:solidFill>
+                <a:latin typeface="Consolas" panose="020B0609020204030204" pitchFamily="49" charset="0"/>
+              </a:rPr>
+              <a:t> = </a:t>
+            </a:r>
+            <a:r>
+              <a:rPr lang="nl-NL" dirty="0" err="1">
+                <a:solidFill>
+                  <a:srgbClr val="DCDCAA"/>
+                </a:solidFill>
+                <a:latin typeface="Consolas" panose="020B0609020204030204" pitchFamily="49" charset="0"/>
+              </a:rPr>
+              <a:t>createEffect</a:t>
+            </a:r>
+            <a:r>
+              <a:rPr lang="nl-NL" dirty="0">
+                <a:solidFill>
+                  <a:srgbClr val="D4D4D4"/>
+                </a:solidFill>
+                <a:latin typeface="Consolas" panose="020B0609020204030204" pitchFamily="49" charset="0"/>
+              </a:rPr>
+              <a:t>(() </a:t>
+            </a:r>
+            <a:r>
+              <a:rPr lang="nl-NL" dirty="0">
+                <a:solidFill>
+                  <a:srgbClr val="569CD6"/>
+                </a:solidFill>
+                <a:latin typeface="Consolas" panose="020B0609020204030204" pitchFamily="49" charset="0"/>
+              </a:rPr>
+              <a:t>=&gt;</a:t>
+            </a:r>
+            <a:endParaRPr lang="nl-NL" dirty="0">
+              <a:solidFill>
+                <a:srgbClr val="D4D4D4"/>
+              </a:solidFill>
+              <a:latin typeface="Consolas" panose="020B0609020204030204" pitchFamily="49" charset="0"/>
+            </a:endParaRPr>
+          </a:p>
+          <a:p>
+            <a:r>
+              <a:rPr lang="nl-NL" dirty="0">
+                <a:solidFill>
+                  <a:srgbClr val="D4D4D4"/>
+                </a:solidFill>
+                <a:latin typeface="Consolas" panose="020B0609020204030204" pitchFamily="49" charset="0"/>
+              </a:rPr>
+              <a:t>    </a:t>
+            </a:r>
+            <a:r>
+              <a:rPr lang="nl-NL" dirty="0" err="1">
+                <a:solidFill>
+                  <a:srgbClr val="569CD6"/>
+                </a:solidFill>
+                <a:latin typeface="Consolas" panose="020B0609020204030204" pitchFamily="49" charset="0"/>
+              </a:rPr>
+              <a:t>this</a:t>
+            </a:r>
+            <a:r>
+              <a:rPr lang="nl-NL" dirty="0" err="1">
+                <a:solidFill>
+                  <a:srgbClr val="D4D4D4"/>
+                </a:solidFill>
+                <a:latin typeface="Consolas" panose="020B0609020204030204" pitchFamily="49" charset="0"/>
+              </a:rPr>
+              <a:t>.</a:t>
+            </a:r>
+            <a:r>
+              <a:rPr lang="nl-NL" dirty="0" err="1">
+                <a:solidFill>
+                  <a:srgbClr val="9CDCFE"/>
+                </a:solidFill>
+                <a:latin typeface="Consolas" panose="020B0609020204030204" pitchFamily="49" charset="0"/>
+              </a:rPr>
+              <a:t>actions$</a:t>
+            </a:r>
+            <a:r>
+              <a:rPr lang="nl-NL" dirty="0" err="1">
+                <a:solidFill>
+                  <a:srgbClr val="D4D4D4"/>
+                </a:solidFill>
+                <a:latin typeface="Consolas" panose="020B0609020204030204" pitchFamily="49" charset="0"/>
+              </a:rPr>
+              <a:t>.</a:t>
+            </a:r>
+            <a:r>
+              <a:rPr lang="nl-NL" dirty="0" err="1">
+                <a:solidFill>
+                  <a:srgbClr val="DCDCAA"/>
+                </a:solidFill>
+                <a:latin typeface="Consolas" panose="020B0609020204030204" pitchFamily="49" charset="0"/>
+              </a:rPr>
+              <a:t>pipe</a:t>
+            </a:r>
+            <a:r>
+              <a:rPr lang="nl-NL" dirty="0">
+                <a:solidFill>
+                  <a:srgbClr val="D4D4D4"/>
+                </a:solidFill>
+                <a:latin typeface="Consolas" panose="020B0609020204030204" pitchFamily="49" charset="0"/>
+              </a:rPr>
+              <a:t>(</a:t>
+            </a:r>
+          </a:p>
+          <a:p>
+            <a:r>
+              <a:rPr lang="nl-NL" dirty="0">
+                <a:solidFill>
+                  <a:srgbClr val="D4D4D4"/>
+                </a:solidFill>
+                <a:latin typeface="Consolas" panose="020B0609020204030204" pitchFamily="49" charset="0"/>
+              </a:rPr>
+              <a:t>      </a:t>
+            </a:r>
+            <a:r>
+              <a:rPr lang="nl-NL" dirty="0" err="1">
+                <a:solidFill>
+                  <a:srgbClr val="DCDCAA"/>
+                </a:solidFill>
+                <a:latin typeface="Consolas" panose="020B0609020204030204" pitchFamily="49" charset="0"/>
+              </a:rPr>
+              <a:t>ofType</a:t>
+            </a:r>
+            <a:r>
+              <a:rPr lang="nl-NL" dirty="0">
+                <a:solidFill>
+                  <a:srgbClr val="D4D4D4"/>
+                </a:solidFill>
+                <a:latin typeface="Consolas" panose="020B0609020204030204" pitchFamily="49" charset="0"/>
+              </a:rPr>
+              <a:t>(</a:t>
+            </a:r>
+            <a:r>
+              <a:rPr lang="nl-NL" dirty="0" err="1">
+                <a:solidFill>
+                  <a:srgbClr val="4FC1FF"/>
+                </a:solidFill>
+                <a:latin typeface="Consolas" panose="020B0609020204030204" pitchFamily="49" charset="0"/>
+              </a:rPr>
+              <a:t>requestProducts</a:t>
+            </a:r>
+            <a:r>
+              <a:rPr lang="nl-NL" dirty="0">
+                <a:solidFill>
+                  <a:srgbClr val="D4D4D4"/>
+                </a:solidFill>
+                <a:latin typeface="Consolas" panose="020B0609020204030204" pitchFamily="49" charset="0"/>
+              </a:rPr>
+              <a:t>),</a:t>
+            </a:r>
+          </a:p>
+          <a:p>
+            <a:r>
+              <a:rPr lang="nl-NL" dirty="0">
+                <a:solidFill>
+                  <a:srgbClr val="D4D4D4"/>
+                </a:solidFill>
+                <a:latin typeface="Consolas" panose="020B0609020204030204" pitchFamily="49" charset="0"/>
+              </a:rPr>
+              <a:t>      </a:t>
+            </a:r>
+            <a:r>
+              <a:rPr lang="nl-NL" dirty="0" err="1">
+                <a:solidFill>
+                  <a:srgbClr val="DCDCAA"/>
+                </a:solidFill>
+                <a:latin typeface="Consolas" panose="020B0609020204030204" pitchFamily="49" charset="0"/>
+              </a:rPr>
+              <a:t>switchMap</a:t>
+            </a:r>
+            <a:r>
+              <a:rPr lang="nl-NL" dirty="0">
+                <a:solidFill>
+                  <a:srgbClr val="D4D4D4"/>
+                </a:solidFill>
+                <a:latin typeface="Consolas" panose="020B0609020204030204" pitchFamily="49" charset="0"/>
+              </a:rPr>
+              <a:t>(() </a:t>
+            </a:r>
+            <a:r>
+              <a:rPr lang="nl-NL" dirty="0">
+                <a:solidFill>
+                  <a:srgbClr val="569CD6"/>
+                </a:solidFill>
+                <a:latin typeface="Consolas" panose="020B0609020204030204" pitchFamily="49" charset="0"/>
+              </a:rPr>
+              <a:t>=&gt;</a:t>
+            </a:r>
+            <a:endParaRPr lang="nl-NL" dirty="0">
+              <a:solidFill>
+                <a:srgbClr val="D4D4D4"/>
+              </a:solidFill>
+              <a:latin typeface="Consolas" panose="020B0609020204030204" pitchFamily="49" charset="0"/>
+            </a:endParaRPr>
+          </a:p>
+          <a:p>
+            <a:r>
+              <a:rPr lang="nl-NL" dirty="0">
+                <a:solidFill>
+                  <a:srgbClr val="D4D4D4"/>
+                </a:solidFill>
+                <a:latin typeface="Consolas" panose="020B0609020204030204" pitchFamily="49" charset="0"/>
+              </a:rPr>
+              <a:t>        </a:t>
+            </a:r>
+            <a:r>
+              <a:rPr lang="nl-NL" dirty="0" err="1">
+                <a:solidFill>
+                  <a:srgbClr val="569CD6"/>
+                </a:solidFill>
+                <a:latin typeface="Consolas" panose="020B0609020204030204" pitchFamily="49" charset="0"/>
+              </a:rPr>
+              <a:t>this</a:t>
+            </a:r>
+            <a:r>
+              <a:rPr lang="nl-NL" dirty="0" err="1">
+                <a:solidFill>
+                  <a:srgbClr val="D4D4D4"/>
+                </a:solidFill>
+                <a:latin typeface="Consolas" panose="020B0609020204030204" pitchFamily="49" charset="0"/>
+              </a:rPr>
+              <a:t>.</a:t>
+            </a:r>
+            <a:r>
+              <a:rPr lang="nl-NL" dirty="0" err="1">
+                <a:solidFill>
+                  <a:srgbClr val="9CDCFE"/>
+                </a:solidFill>
+                <a:latin typeface="Consolas" panose="020B0609020204030204" pitchFamily="49" charset="0"/>
+              </a:rPr>
+              <a:t>productService</a:t>
+            </a:r>
+            <a:r>
+              <a:rPr lang="nl-NL" dirty="0" err="1">
+                <a:solidFill>
+                  <a:srgbClr val="D4D4D4"/>
+                </a:solidFill>
+                <a:latin typeface="Consolas" panose="020B0609020204030204" pitchFamily="49" charset="0"/>
+              </a:rPr>
+              <a:t>.</a:t>
+            </a:r>
+            <a:r>
+              <a:rPr lang="nl-NL" dirty="0" err="1">
+                <a:solidFill>
+                  <a:srgbClr val="DCDCAA"/>
+                </a:solidFill>
+                <a:latin typeface="Consolas" panose="020B0609020204030204" pitchFamily="49" charset="0"/>
+              </a:rPr>
+              <a:t>getProducts</a:t>
+            </a:r>
+            <a:r>
+              <a:rPr lang="nl-NL" dirty="0">
+                <a:solidFill>
+                  <a:srgbClr val="D4D4D4"/>
+                </a:solidFill>
+                <a:latin typeface="Consolas" panose="020B0609020204030204" pitchFamily="49" charset="0"/>
+              </a:rPr>
+              <a:t>().</a:t>
+            </a:r>
+            <a:r>
+              <a:rPr lang="nl-NL" dirty="0">
+                <a:solidFill>
+                  <a:srgbClr val="DCDCAA"/>
+                </a:solidFill>
+                <a:latin typeface="Consolas" panose="020B0609020204030204" pitchFamily="49" charset="0"/>
+              </a:rPr>
+              <a:t>pipe</a:t>
+            </a:r>
+            <a:r>
+              <a:rPr lang="nl-NL" dirty="0">
+                <a:solidFill>
+                  <a:srgbClr val="D4D4D4"/>
+                </a:solidFill>
+                <a:latin typeface="Consolas" panose="020B0609020204030204" pitchFamily="49" charset="0"/>
+              </a:rPr>
+              <a:t>(</a:t>
+            </a:r>
+          </a:p>
+          <a:p>
+            <a:r>
+              <a:rPr lang="nl-NL" dirty="0">
+                <a:solidFill>
+                  <a:srgbClr val="D4D4D4"/>
+                </a:solidFill>
+                <a:latin typeface="Consolas" panose="020B0609020204030204" pitchFamily="49" charset="0"/>
+              </a:rPr>
+              <a:t>          </a:t>
+            </a:r>
+            <a:r>
+              <a:rPr lang="nl-NL" dirty="0">
+                <a:solidFill>
+                  <a:srgbClr val="DCDCAA"/>
+                </a:solidFill>
+                <a:latin typeface="Consolas" panose="020B0609020204030204" pitchFamily="49" charset="0"/>
+              </a:rPr>
+              <a:t>map</a:t>
+            </a:r>
+            <a:r>
+              <a:rPr lang="nl-NL" dirty="0">
+                <a:solidFill>
+                  <a:srgbClr val="D4D4D4"/>
+                </a:solidFill>
+                <a:latin typeface="Consolas" panose="020B0609020204030204" pitchFamily="49" charset="0"/>
+              </a:rPr>
+              <a:t>((</a:t>
+            </a:r>
+            <a:r>
+              <a:rPr lang="nl-NL" dirty="0" err="1">
+                <a:solidFill>
+                  <a:srgbClr val="9CDCFE"/>
+                </a:solidFill>
+                <a:latin typeface="Consolas" panose="020B0609020204030204" pitchFamily="49" charset="0"/>
+              </a:rPr>
+              <a:t>products</a:t>
+            </a:r>
+            <a:r>
+              <a:rPr lang="nl-NL" dirty="0">
+                <a:solidFill>
+                  <a:srgbClr val="D4D4D4"/>
+                </a:solidFill>
+                <a:latin typeface="Consolas" panose="020B0609020204030204" pitchFamily="49" charset="0"/>
+              </a:rPr>
+              <a:t>) </a:t>
+            </a:r>
+            <a:r>
+              <a:rPr lang="nl-NL" dirty="0">
+                <a:solidFill>
+                  <a:srgbClr val="569CD6"/>
+                </a:solidFill>
+                <a:latin typeface="Consolas" panose="020B0609020204030204" pitchFamily="49" charset="0"/>
+              </a:rPr>
+              <a:t>=&gt;</a:t>
+            </a:r>
+            <a:r>
+              <a:rPr lang="nl-NL" dirty="0">
+                <a:solidFill>
+                  <a:srgbClr val="D4D4D4"/>
+                </a:solidFill>
+                <a:latin typeface="Consolas" panose="020B0609020204030204" pitchFamily="49" charset="0"/>
+              </a:rPr>
+              <a:t> </a:t>
+            </a:r>
+            <a:r>
+              <a:rPr lang="nl-NL" dirty="0" err="1">
+                <a:solidFill>
+                  <a:srgbClr val="DCDCAA"/>
+                </a:solidFill>
+                <a:latin typeface="Consolas" panose="020B0609020204030204" pitchFamily="49" charset="0"/>
+              </a:rPr>
+              <a:t>requestProductsSuccess</a:t>
+            </a:r>
+            <a:r>
+              <a:rPr lang="nl-NL" dirty="0">
+                <a:solidFill>
+                  <a:srgbClr val="D4D4D4"/>
+                </a:solidFill>
+                <a:latin typeface="Consolas" panose="020B0609020204030204" pitchFamily="49" charset="0"/>
+              </a:rPr>
+              <a:t>({ </a:t>
+            </a:r>
+            <a:r>
+              <a:rPr lang="nl-NL" dirty="0" err="1">
+                <a:solidFill>
+                  <a:srgbClr val="9CDCFE"/>
+                </a:solidFill>
+                <a:latin typeface="Consolas" panose="020B0609020204030204" pitchFamily="49" charset="0"/>
+              </a:rPr>
+              <a:t>products</a:t>
+            </a:r>
+            <a:r>
+              <a:rPr lang="nl-NL" dirty="0">
+                <a:solidFill>
+                  <a:srgbClr val="D4D4D4"/>
+                </a:solidFill>
+                <a:latin typeface="Consolas" panose="020B0609020204030204" pitchFamily="49" charset="0"/>
+              </a:rPr>
+              <a:t> })),</a:t>
+            </a:r>
+          </a:p>
+          <a:p>
+            <a:r>
+              <a:rPr lang="nl-NL" dirty="0">
+                <a:solidFill>
+                  <a:srgbClr val="D4D4D4"/>
+                </a:solidFill>
+                <a:latin typeface="Consolas" panose="020B0609020204030204" pitchFamily="49" charset="0"/>
+              </a:rPr>
+              <a:t>          </a:t>
+            </a:r>
+            <a:r>
+              <a:rPr lang="nl-NL" dirty="0" err="1">
+                <a:solidFill>
+                  <a:srgbClr val="DCDCAA"/>
+                </a:solidFill>
+                <a:latin typeface="Consolas" panose="020B0609020204030204" pitchFamily="49" charset="0"/>
+              </a:rPr>
+              <a:t>catchError</a:t>
+            </a:r>
+            <a:r>
+              <a:rPr lang="nl-NL" dirty="0">
+                <a:solidFill>
+                  <a:srgbClr val="D4D4D4"/>
+                </a:solidFill>
+                <a:latin typeface="Consolas" panose="020B0609020204030204" pitchFamily="49" charset="0"/>
+              </a:rPr>
+              <a:t>(() </a:t>
+            </a:r>
+            <a:r>
+              <a:rPr lang="nl-NL" dirty="0">
+                <a:solidFill>
+                  <a:srgbClr val="569CD6"/>
+                </a:solidFill>
+                <a:latin typeface="Consolas" panose="020B0609020204030204" pitchFamily="49" charset="0"/>
+              </a:rPr>
+              <a:t>=&gt;</a:t>
+            </a:r>
+            <a:endParaRPr lang="nl-NL" dirty="0">
+              <a:solidFill>
+                <a:srgbClr val="D4D4D4"/>
+              </a:solidFill>
+              <a:latin typeface="Consolas" panose="020B0609020204030204" pitchFamily="49" charset="0"/>
+            </a:endParaRPr>
+          </a:p>
+          <a:p>
+            <a:r>
+              <a:rPr lang="nl-NL" dirty="0">
+                <a:solidFill>
+                  <a:srgbClr val="D4D4D4"/>
+                </a:solidFill>
+                <a:latin typeface="Consolas" panose="020B0609020204030204" pitchFamily="49" charset="0"/>
+              </a:rPr>
+              <a:t>            </a:t>
+            </a:r>
+            <a:r>
+              <a:rPr lang="nl-NL" dirty="0">
+                <a:solidFill>
+                  <a:srgbClr val="DCDCAA"/>
+                </a:solidFill>
+                <a:latin typeface="Consolas" panose="020B0609020204030204" pitchFamily="49" charset="0"/>
+              </a:rPr>
+              <a:t>of</a:t>
+            </a:r>
+            <a:r>
+              <a:rPr lang="nl-NL" dirty="0">
+                <a:solidFill>
+                  <a:srgbClr val="D4D4D4"/>
+                </a:solidFill>
+                <a:latin typeface="Consolas" panose="020B0609020204030204" pitchFamily="49" charset="0"/>
+              </a:rPr>
+              <a:t>(</a:t>
+            </a:r>
+            <a:r>
+              <a:rPr lang="nl-NL" dirty="0" err="1">
+                <a:solidFill>
+                  <a:srgbClr val="DCDCAA"/>
+                </a:solidFill>
+                <a:latin typeface="Consolas" panose="020B0609020204030204" pitchFamily="49" charset="0"/>
+              </a:rPr>
+              <a:t>requestProductsFailure</a:t>
+            </a:r>
+            <a:r>
+              <a:rPr lang="nl-NL" dirty="0">
+                <a:solidFill>
+                  <a:srgbClr val="D4D4D4"/>
+                </a:solidFill>
+                <a:latin typeface="Consolas" panose="020B0609020204030204" pitchFamily="49" charset="0"/>
+              </a:rPr>
+              <a:t>({ </a:t>
+            </a:r>
+            <a:r>
+              <a:rPr lang="nl-NL" dirty="0">
+                <a:solidFill>
+                  <a:srgbClr val="9CDCFE"/>
+                </a:solidFill>
+                <a:latin typeface="Consolas" panose="020B0609020204030204" pitchFamily="49" charset="0"/>
+              </a:rPr>
+              <a:t>error:</a:t>
+            </a:r>
+            <a:r>
+              <a:rPr lang="nl-NL" dirty="0">
+                <a:solidFill>
+                  <a:srgbClr val="D4D4D4"/>
+                </a:solidFill>
+                <a:latin typeface="Consolas" panose="020B0609020204030204" pitchFamily="49" charset="0"/>
+              </a:rPr>
+              <a:t> </a:t>
+            </a:r>
+            <a:r>
+              <a:rPr lang="nl-NL" dirty="0">
+                <a:solidFill>
+                  <a:srgbClr val="CE9178"/>
+                </a:solidFill>
+                <a:latin typeface="Consolas" panose="020B0609020204030204" pitchFamily="49" charset="0"/>
+              </a:rPr>
+              <a:t>'</a:t>
+            </a:r>
+            <a:r>
+              <a:rPr lang="nl-NL" dirty="0" err="1">
+                <a:solidFill>
+                  <a:srgbClr val="CE9178"/>
+                </a:solidFill>
+                <a:latin typeface="Consolas" panose="020B0609020204030204" pitchFamily="49" charset="0"/>
+              </a:rPr>
+              <a:t>Some</a:t>
+            </a:r>
+            <a:r>
+              <a:rPr lang="nl-NL" dirty="0">
+                <a:solidFill>
+                  <a:srgbClr val="CE9178"/>
+                </a:solidFill>
+                <a:latin typeface="Consolas" panose="020B0609020204030204" pitchFamily="49" charset="0"/>
+              </a:rPr>
+              <a:t> </a:t>
+            </a:r>
+            <a:r>
+              <a:rPr lang="nl-NL" dirty="0" err="1">
+                <a:solidFill>
+                  <a:srgbClr val="CE9178"/>
+                </a:solidFill>
+                <a:latin typeface="Consolas" panose="020B0609020204030204" pitchFamily="49" charset="0"/>
+              </a:rPr>
+              <a:t>message</a:t>
+            </a:r>
+            <a:r>
+              <a:rPr lang="nl-NL" dirty="0">
+                <a:solidFill>
+                  <a:srgbClr val="CE9178"/>
+                </a:solidFill>
+                <a:latin typeface="Consolas" panose="020B0609020204030204" pitchFamily="49" charset="0"/>
+              </a:rPr>
+              <a:t>'</a:t>
+            </a:r>
+            <a:r>
+              <a:rPr lang="nl-NL" dirty="0">
+                <a:solidFill>
+                  <a:srgbClr val="D4D4D4"/>
+                </a:solidFill>
+                <a:latin typeface="Consolas" panose="020B0609020204030204" pitchFamily="49" charset="0"/>
+              </a:rPr>
+              <a:t> }))</a:t>
+            </a:r>
+          </a:p>
+          <a:p>
+            <a:r>
+              <a:rPr lang="nl-NL" dirty="0">
+                <a:solidFill>
+                  <a:srgbClr val="D4D4D4"/>
+                </a:solidFill>
+                <a:latin typeface="Consolas" panose="020B0609020204030204" pitchFamily="49" charset="0"/>
+              </a:rPr>
+              <a:t>          )</a:t>
+            </a:r>
+          </a:p>
+          <a:p>
+            <a:r>
+              <a:rPr lang="nl-NL" dirty="0">
+                <a:solidFill>
+                  <a:srgbClr val="D4D4D4"/>
+                </a:solidFill>
+                <a:latin typeface="Consolas" panose="020B0609020204030204" pitchFamily="49" charset="0"/>
+              </a:rPr>
+              <a:t>        )</a:t>
+            </a:r>
+          </a:p>
+          <a:p>
+            <a:r>
+              <a:rPr lang="nl-NL" dirty="0">
+                <a:solidFill>
+                  <a:srgbClr val="D4D4D4"/>
+                </a:solidFill>
+                <a:latin typeface="Consolas" panose="020B0609020204030204" pitchFamily="49" charset="0"/>
+              </a:rPr>
+              <a:t>      )</a:t>
+            </a:r>
+          </a:p>
+          <a:p>
+            <a:r>
+              <a:rPr lang="nl-NL" dirty="0">
+                <a:solidFill>
+                  <a:srgbClr val="D4D4D4"/>
+                </a:solidFill>
+                <a:latin typeface="Consolas" panose="020B0609020204030204" pitchFamily="49" charset="0"/>
+              </a:rPr>
+              <a:t>    )</a:t>
+            </a:r>
+          </a:p>
+          <a:p>
+            <a:r>
+              <a:rPr lang="nl-NL" dirty="0">
+                <a:solidFill>
+                  <a:srgbClr val="D4D4D4"/>
+                </a:solidFill>
+                <a:latin typeface="Consolas" panose="020B0609020204030204" pitchFamily="49" charset="0"/>
+              </a:rPr>
+              <a:t>  );</a:t>
+            </a:r>
+            <a:endParaRPr lang="nl-NL" b="0" dirty="0">
+              <a:solidFill>
+                <a:srgbClr val="D4D4D4"/>
+              </a:solidFill>
+              <a:effectLst/>
+              <a:latin typeface="Consolas" panose="020B0609020204030204" pitchFamily="49" charset="0"/>
+            </a:endParaRPr>
+          </a:p>
+        </p:txBody>
+      </p:sp>
+    </p:spTree>
+    <p:extLst>
+      <p:ext uri="{BB962C8B-B14F-4D97-AF65-F5344CB8AC3E}">
+        <p14:creationId xmlns:p14="http://schemas.microsoft.com/office/powerpoint/2010/main" val="4164782675"/>
+      </p:ext>
+    </p:extLst>
+  </p:cSld>
+  <p:clrMapOvr>
+    <a:masterClrMapping/>
+  </p:clrMapOvr>
+</p:sld>
+</file>
+
+<file path=ppt/slides/slide13.xml><?xml version="1.0" encoding="utf-8"?>
+<p:sld xmlns:a="http://schemas.openxmlformats.org/drawingml/2006/main" xmlns:r="http://schemas.openxmlformats.org/officeDocument/2006/relationships" xmlns:p="http://schemas.openxmlformats.org/presentationml/2006/main">
+  <p:cSld>
+    <p:spTree>
+      <p:nvGrpSpPr>
+        <p:cNvPr id="1" name=""/>
+        <p:cNvGrpSpPr/>
+        <p:nvPr/>
+      </p:nvGrpSpPr>
+      <p:grpSpPr>
+        <a:xfrm>
+          <a:off x="0" y="0"/>
+          <a:ext cx="0" cy="0"/>
+          <a:chOff x="0" y="0"/>
+          <a:chExt cx="0" cy="0"/>
+        </a:xfrm>
+      </p:grpSpPr>
+      <p:sp>
+        <p:nvSpPr>
+          <p:cNvPr id="2" name="Title 1">
+            <a:extLst>
+              <a:ext uri="{FF2B5EF4-FFF2-40B4-BE49-F238E27FC236}">
+                <a16:creationId xmlns:a16="http://schemas.microsoft.com/office/drawing/2014/main" id="{58A75D02-8D99-4750-B95C-655E0DA90887}"/>
+              </a:ext>
+            </a:extLst>
+          </p:cNvPr>
+          <p:cNvSpPr>
+            <a:spLocks noGrp="1"/>
+          </p:cNvSpPr>
+          <p:nvPr>
+            <p:ph type="title"/>
+          </p:nvPr>
+        </p:nvSpPr>
+        <p:spPr/>
+        <p:txBody>
+          <a:bodyPr/>
+          <a:lstStyle/>
+          <a:p>
+            <a:r>
+              <a:rPr lang="en-US" dirty="0"/>
+              <a:t>NGRX - Reducer</a:t>
+            </a:r>
+            <a:endParaRPr lang="nl-NL" dirty="0"/>
+          </a:p>
+        </p:txBody>
+      </p:sp>
+      <p:sp>
+        <p:nvSpPr>
+          <p:cNvPr id="4" name="Rectangle 3">
+            <a:extLst>
+              <a:ext uri="{FF2B5EF4-FFF2-40B4-BE49-F238E27FC236}">
+                <a16:creationId xmlns:a16="http://schemas.microsoft.com/office/drawing/2014/main" id="{D65DEED7-7252-49A2-AD14-E7385E5C45E7}"/>
+              </a:ext>
+            </a:extLst>
+          </p:cNvPr>
+          <p:cNvSpPr/>
+          <p:nvPr/>
+        </p:nvSpPr>
+        <p:spPr>
+          <a:xfrm>
+            <a:off x="1437600" y="2214694"/>
+            <a:ext cx="9316800" cy="3416320"/>
+          </a:xfrm>
+          <a:prstGeom prst="rect">
+            <a:avLst/>
+          </a:prstGeom>
+          <a:solidFill>
+            <a:schemeClr val="tx1"/>
+          </a:solidFill>
+        </p:spPr>
+        <p:txBody>
+          <a:bodyPr wrap="square">
+            <a:spAutoFit/>
+          </a:bodyPr>
+          <a:lstStyle/>
+          <a:p>
+            <a:r>
+              <a:rPr lang="nl-NL" dirty="0" err="1">
+                <a:solidFill>
+                  <a:srgbClr val="569CD6"/>
+                </a:solidFill>
+                <a:latin typeface="Consolas" panose="020B0609020204030204" pitchFamily="49" charset="0"/>
+              </a:rPr>
+              <a:t>const</a:t>
+            </a:r>
+            <a:r>
+              <a:rPr lang="nl-NL" dirty="0">
+                <a:solidFill>
+                  <a:srgbClr val="D4D4D4"/>
+                </a:solidFill>
+                <a:latin typeface="Consolas" panose="020B0609020204030204" pitchFamily="49" charset="0"/>
+              </a:rPr>
+              <a:t> </a:t>
+            </a:r>
+            <a:r>
+              <a:rPr lang="nl-NL" dirty="0" err="1">
+                <a:solidFill>
+                  <a:srgbClr val="DCDCAA"/>
+                </a:solidFill>
+                <a:latin typeface="Consolas" panose="020B0609020204030204" pitchFamily="49" charset="0"/>
+              </a:rPr>
+              <a:t>reducer</a:t>
+            </a:r>
+            <a:r>
+              <a:rPr lang="nl-NL" dirty="0">
+                <a:solidFill>
+                  <a:srgbClr val="D4D4D4"/>
+                </a:solidFill>
+                <a:latin typeface="Consolas" panose="020B0609020204030204" pitchFamily="49" charset="0"/>
+              </a:rPr>
+              <a:t> = </a:t>
+            </a:r>
+            <a:r>
+              <a:rPr lang="nl-NL" dirty="0" err="1">
+                <a:solidFill>
+                  <a:srgbClr val="DCDCAA"/>
+                </a:solidFill>
+                <a:latin typeface="Consolas" panose="020B0609020204030204" pitchFamily="49" charset="0"/>
+              </a:rPr>
+              <a:t>createReducer</a:t>
+            </a:r>
+            <a:r>
+              <a:rPr lang="nl-NL" dirty="0">
+                <a:solidFill>
+                  <a:srgbClr val="D4D4D4"/>
+                </a:solidFill>
+                <a:latin typeface="Consolas" panose="020B0609020204030204" pitchFamily="49" charset="0"/>
+              </a:rPr>
+              <a:t>(</a:t>
+            </a:r>
+          </a:p>
+          <a:p>
+            <a:r>
+              <a:rPr lang="nl-NL" dirty="0">
+                <a:solidFill>
+                  <a:srgbClr val="D4D4D4"/>
+                </a:solidFill>
+                <a:latin typeface="Consolas" panose="020B0609020204030204" pitchFamily="49" charset="0"/>
+              </a:rPr>
+              <a:t>  </a:t>
+            </a:r>
+            <a:r>
+              <a:rPr lang="nl-NL" dirty="0" err="1">
+                <a:solidFill>
+                  <a:srgbClr val="4FC1FF"/>
+                </a:solidFill>
+                <a:latin typeface="Consolas" panose="020B0609020204030204" pitchFamily="49" charset="0"/>
+              </a:rPr>
+              <a:t>initialState</a:t>
+            </a:r>
+            <a:r>
+              <a:rPr lang="nl-NL" dirty="0">
+                <a:solidFill>
+                  <a:srgbClr val="D4D4D4"/>
+                </a:solidFill>
+                <a:latin typeface="Consolas" panose="020B0609020204030204" pitchFamily="49" charset="0"/>
+              </a:rPr>
+              <a:t>,</a:t>
+            </a:r>
+          </a:p>
+          <a:p>
+            <a:r>
+              <a:rPr lang="nl-NL" dirty="0">
+                <a:solidFill>
+                  <a:srgbClr val="D4D4D4"/>
+                </a:solidFill>
+                <a:latin typeface="Consolas" panose="020B0609020204030204" pitchFamily="49" charset="0"/>
+              </a:rPr>
+              <a:t>  </a:t>
+            </a:r>
+            <a:r>
+              <a:rPr lang="nl-NL" dirty="0">
+                <a:solidFill>
+                  <a:srgbClr val="DCDCAA"/>
+                </a:solidFill>
+                <a:latin typeface="Consolas" panose="020B0609020204030204" pitchFamily="49" charset="0"/>
+              </a:rPr>
+              <a:t>on</a:t>
+            </a:r>
+            <a:r>
+              <a:rPr lang="nl-NL" dirty="0">
+                <a:solidFill>
+                  <a:srgbClr val="D4D4D4"/>
+                </a:solidFill>
+                <a:latin typeface="Consolas" panose="020B0609020204030204" pitchFamily="49" charset="0"/>
+              </a:rPr>
+              <a:t>(</a:t>
+            </a:r>
+            <a:r>
+              <a:rPr lang="nl-NL" dirty="0" err="1">
+                <a:solidFill>
+                  <a:srgbClr val="4FC1FF"/>
+                </a:solidFill>
+                <a:latin typeface="Consolas" panose="020B0609020204030204" pitchFamily="49" charset="0"/>
+              </a:rPr>
+              <a:t>requestProductsSuccess</a:t>
+            </a:r>
+            <a:r>
+              <a:rPr lang="nl-NL" dirty="0">
+                <a:solidFill>
+                  <a:srgbClr val="D4D4D4"/>
+                </a:solidFill>
+                <a:latin typeface="Consolas" panose="020B0609020204030204" pitchFamily="49" charset="0"/>
+              </a:rPr>
+              <a:t>, (</a:t>
+            </a:r>
+            <a:r>
+              <a:rPr lang="nl-NL" dirty="0">
+                <a:solidFill>
+                  <a:srgbClr val="9CDCFE"/>
+                </a:solidFill>
+                <a:latin typeface="Consolas" panose="020B0609020204030204" pitchFamily="49" charset="0"/>
+              </a:rPr>
+              <a:t>state</a:t>
+            </a:r>
+            <a:r>
+              <a:rPr lang="nl-NL" dirty="0">
+                <a:solidFill>
+                  <a:srgbClr val="D4D4D4"/>
+                </a:solidFill>
+                <a:latin typeface="Consolas" panose="020B0609020204030204" pitchFamily="49" charset="0"/>
+              </a:rPr>
+              <a:t>, { </a:t>
+            </a:r>
+            <a:r>
+              <a:rPr lang="nl-NL" dirty="0" err="1">
+                <a:solidFill>
+                  <a:srgbClr val="9CDCFE"/>
+                </a:solidFill>
+                <a:latin typeface="Consolas" panose="020B0609020204030204" pitchFamily="49" charset="0"/>
+              </a:rPr>
+              <a:t>products</a:t>
+            </a:r>
+            <a:r>
+              <a:rPr lang="nl-NL" dirty="0">
+                <a:solidFill>
+                  <a:srgbClr val="D4D4D4"/>
+                </a:solidFill>
+                <a:latin typeface="Consolas" panose="020B0609020204030204" pitchFamily="49" charset="0"/>
+              </a:rPr>
+              <a:t> }) </a:t>
+            </a:r>
+            <a:r>
+              <a:rPr lang="nl-NL" dirty="0">
+                <a:solidFill>
+                  <a:srgbClr val="569CD6"/>
+                </a:solidFill>
+                <a:latin typeface="Consolas" panose="020B0609020204030204" pitchFamily="49" charset="0"/>
+              </a:rPr>
+              <a:t>=&gt;</a:t>
+            </a:r>
+            <a:r>
+              <a:rPr lang="nl-NL" dirty="0">
+                <a:solidFill>
+                  <a:srgbClr val="D4D4D4"/>
+                </a:solidFill>
+                <a:latin typeface="Consolas" panose="020B0609020204030204" pitchFamily="49" charset="0"/>
+              </a:rPr>
+              <a:t> {</a:t>
+            </a:r>
+          </a:p>
+          <a:p>
+            <a:r>
+              <a:rPr lang="nl-NL" dirty="0">
+                <a:solidFill>
+                  <a:srgbClr val="D4D4D4"/>
+                </a:solidFill>
+                <a:latin typeface="Consolas" panose="020B0609020204030204" pitchFamily="49" charset="0"/>
+              </a:rPr>
+              <a:t>    </a:t>
+            </a:r>
+            <a:r>
+              <a:rPr lang="nl-NL" dirty="0" err="1">
+                <a:solidFill>
+                  <a:srgbClr val="569CD6"/>
+                </a:solidFill>
+                <a:latin typeface="Consolas" panose="020B0609020204030204" pitchFamily="49" charset="0"/>
+              </a:rPr>
+              <a:t>const</a:t>
+            </a:r>
+            <a:r>
+              <a:rPr lang="nl-NL" dirty="0">
+                <a:solidFill>
+                  <a:srgbClr val="D4D4D4"/>
+                </a:solidFill>
+                <a:latin typeface="Consolas" panose="020B0609020204030204" pitchFamily="49" charset="0"/>
+              </a:rPr>
+              <a:t> </a:t>
+            </a:r>
+            <a:r>
+              <a:rPr lang="nl-NL" dirty="0" err="1">
+                <a:solidFill>
+                  <a:srgbClr val="4FC1FF"/>
+                </a:solidFill>
+                <a:latin typeface="Consolas" panose="020B0609020204030204" pitchFamily="49" charset="0"/>
+              </a:rPr>
+              <a:t>updatedState</a:t>
+            </a:r>
+            <a:r>
+              <a:rPr lang="nl-NL" dirty="0">
+                <a:solidFill>
+                  <a:srgbClr val="D4D4D4"/>
+                </a:solidFill>
+                <a:latin typeface="Consolas" panose="020B0609020204030204" pitchFamily="49" charset="0"/>
+              </a:rPr>
+              <a:t> = { ...</a:t>
+            </a:r>
+            <a:r>
+              <a:rPr lang="nl-NL" dirty="0">
+                <a:solidFill>
+                  <a:srgbClr val="9CDCFE"/>
+                </a:solidFill>
+                <a:latin typeface="Consolas" panose="020B0609020204030204" pitchFamily="49" charset="0"/>
+              </a:rPr>
+              <a:t>state</a:t>
+            </a:r>
+            <a:r>
+              <a:rPr lang="nl-NL" dirty="0">
+                <a:solidFill>
+                  <a:srgbClr val="D4D4D4"/>
+                </a:solidFill>
+                <a:latin typeface="Consolas" panose="020B0609020204030204" pitchFamily="49" charset="0"/>
+              </a:rPr>
+              <a:t> };</a:t>
+            </a:r>
+          </a:p>
+          <a:p>
+            <a:r>
+              <a:rPr lang="nl-NL" dirty="0">
+                <a:solidFill>
+                  <a:srgbClr val="D4D4D4"/>
+                </a:solidFill>
+                <a:latin typeface="Consolas" panose="020B0609020204030204" pitchFamily="49" charset="0"/>
+              </a:rPr>
+              <a:t>    </a:t>
+            </a:r>
+            <a:r>
+              <a:rPr lang="nl-NL" dirty="0" err="1">
+                <a:solidFill>
+                  <a:srgbClr val="4FC1FF"/>
+                </a:solidFill>
+                <a:latin typeface="Consolas" panose="020B0609020204030204" pitchFamily="49" charset="0"/>
+              </a:rPr>
+              <a:t>updatedState</a:t>
+            </a:r>
+            <a:r>
+              <a:rPr lang="nl-NL" dirty="0" err="1">
+                <a:solidFill>
+                  <a:srgbClr val="D4D4D4"/>
+                </a:solidFill>
+                <a:latin typeface="Consolas" panose="020B0609020204030204" pitchFamily="49" charset="0"/>
+              </a:rPr>
+              <a:t>.</a:t>
+            </a:r>
+            <a:r>
+              <a:rPr lang="nl-NL" dirty="0" err="1">
+                <a:solidFill>
+                  <a:srgbClr val="9CDCFE"/>
+                </a:solidFill>
+                <a:latin typeface="Consolas" panose="020B0609020204030204" pitchFamily="49" charset="0"/>
+              </a:rPr>
+              <a:t>products</a:t>
+            </a:r>
+            <a:r>
+              <a:rPr lang="nl-NL" dirty="0">
+                <a:solidFill>
+                  <a:srgbClr val="D4D4D4"/>
+                </a:solidFill>
+                <a:latin typeface="Consolas" panose="020B0609020204030204" pitchFamily="49" charset="0"/>
+              </a:rPr>
+              <a:t> = </a:t>
+            </a:r>
+            <a:r>
+              <a:rPr lang="nl-NL" dirty="0" err="1">
+                <a:solidFill>
+                  <a:srgbClr val="9CDCFE"/>
+                </a:solidFill>
+                <a:latin typeface="Consolas" panose="020B0609020204030204" pitchFamily="49" charset="0"/>
+              </a:rPr>
+              <a:t>products</a:t>
+            </a:r>
+            <a:r>
+              <a:rPr lang="nl-NL" dirty="0" err="1">
+                <a:solidFill>
+                  <a:srgbClr val="D4D4D4"/>
+                </a:solidFill>
+                <a:latin typeface="Consolas" panose="020B0609020204030204" pitchFamily="49" charset="0"/>
+              </a:rPr>
+              <a:t>.</a:t>
+            </a:r>
+            <a:r>
+              <a:rPr lang="nl-NL" dirty="0" err="1">
+                <a:solidFill>
+                  <a:srgbClr val="DCDCAA"/>
+                </a:solidFill>
+                <a:latin typeface="Consolas" panose="020B0609020204030204" pitchFamily="49" charset="0"/>
+              </a:rPr>
+              <a:t>reduce</a:t>
+            </a:r>
+            <a:r>
+              <a:rPr lang="nl-NL" dirty="0">
+                <a:solidFill>
+                  <a:srgbClr val="D4D4D4"/>
+                </a:solidFill>
+                <a:latin typeface="Consolas" panose="020B0609020204030204" pitchFamily="49" charset="0"/>
+              </a:rPr>
+              <a:t>((</a:t>
+            </a:r>
+            <a:r>
+              <a:rPr lang="nl-NL" dirty="0" err="1">
+                <a:solidFill>
+                  <a:srgbClr val="9CDCFE"/>
+                </a:solidFill>
+                <a:latin typeface="Consolas" panose="020B0609020204030204" pitchFamily="49" charset="0"/>
+              </a:rPr>
+              <a:t>aggregation</a:t>
+            </a:r>
+            <a:r>
+              <a:rPr lang="nl-NL" dirty="0">
+                <a:solidFill>
+                  <a:srgbClr val="D4D4D4"/>
+                </a:solidFill>
+                <a:latin typeface="Consolas" panose="020B0609020204030204" pitchFamily="49" charset="0"/>
+              </a:rPr>
+              <a:t>, </a:t>
+            </a:r>
+            <a:r>
+              <a:rPr lang="nl-NL" dirty="0">
+                <a:solidFill>
+                  <a:srgbClr val="9CDCFE"/>
+                </a:solidFill>
+                <a:latin typeface="Consolas" panose="020B0609020204030204" pitchFamily="49" charset="0"/>
+              </a:rPr>
+              <a:t>product</a:t>
+            </a:r>
+            <a:r>
+              <a:rPr lang="nl-NL" dirty="0">
+                <a:solidFill>
+                  <a:srgbClr val="D4D4D4"/>
+                </a:solidFill>
+                <a:latin typeface="Consolas" panose="020B0609020204030204" pitchFamily="49" charset="0"/>
+              </a:rPr>
+              <a:t>) </a:t>
+            </a:r>
+            <a:r>
+              <a:rPr lang="nl-NL" dirty="0">
+                <a:solidFill>
+                  <a:srgbClr val="569CD6"/>
+                </a:solidFill>
+                <a:latin typeface="Consolas" panose="020B0609020204030204" pitchFamily="49" charset="0"/>
+              </a:rPr>
+              <a:t>=&gt;</a:t>
+            </a:r>
+            <a:r>
+              <a:rPr lang="nl-NL" dirty="0">
+                <a:solidFill>
+                  <a:srgbClr val="D4D4D4"/>
+                </a:solidFill>
+                <a:latin typeface="Consolas" panose="020B0609020204030204" pitchFamily="49" charset="0"/>
+              </a:rPr>
+              <a:t> {</a:t>
+            </a:r>
+          </a:p>
+          <a:p>
+            <a:r>
+              <a:rPr lang="nl-NL" dirty="0">
+                <a:solidFill>
+                  <a:srgbClr val="D4D4D4"/>
+                </a:solidFill>
+                <a:latin typeface="Consolas" panose="020B0609020204030204" pitchFamily="49" charset="0"/>
+              </a:rPr>
+              <a:t>      </a:t>
+            </a:r>
+            <a:r>
+              <a:rPr lang="nl-NL" dirty="0" err="1">
+                <a:solidFill>
+                  <a:srgbClr val="9CDCFE"/>
+                </a:solidFill>
+                <a:latin typeface="Consolas" panose="020B0609020204030204" pitchFamily="49" charset="0"/>
+              </a:rPr>
+              <a:t>aggregation</a:t>
+            </a:r>
+            <a:r>
+              <a:rPr lang="nl-NL" dirty="0">
+                <a:solidFill>
+                  <a:srgbClr val="D4D4D4"/>
+                </a:solidFill>
+                <a:latin typeface="Consolas" panose="020B0609020204030204" pitchFamily="49" charset="0"/>
+              </a:rPr>
+              <a:t>[</a:t>
+            </a:r>
+            <a:r>
+              <a:rPr lang="nl-NL" dirty="0">
+                <a:solidFill>
+                  <a:srgbClr val="9CDCFE"/>
+                </a:solidFill>
+                <a:latin typeface="Consolas" panose="020B0609020204030204" pitchFamily="49" charset="0"/>
+              </a:rPr>
+              <a:t>product</a:t>
+            </a:r>
+            <a:r>
+              <a:rPr lang="nl-NL" dirty="0">
+                <a:solidFill>
+                  <a:srgbClr val="D4D4D4"/>
+                </a:solidFill>
+                <a:latin typeface="Consolas" panose="020B0609020204030204" pitchFamily="49" charset="0"/>
+              </a:rPr>
+              <a:t>.</a:t>
+            </a:r>
+            <a:r>
+              <a:rPr lang="nl-NL" dirty="0">
+                <a:solidFill>
+                  <a:srgbClr val="9CDCFE"/>
+                </a:solidFill>
+                <a:latin typeface="Consolas" panose="020B0609020204030204" pitchFamily="49" charset="0"/>
+              </a:rPr>
+              <a:t>id</a:t>
+            </a:r>
+            <a:r>
+              <a:rPr lang="nl-NL" dirty="0">
+                <a:solidFill>
+                  <a:srgbClr val="D4D4D4"/>
+                </a:solidFill>
+                <a:latin typeface="Consolas" panose="020B0609020204030204" pitchFamily="49" charset="0"/>
+              </a:rPr>
+              <a:t>] = </a:t>
+            </a:r>
+            <a:r>
+              <a:rPr lang="nl-NL" dirty="0">
+                <a:solidFill>
+                  <a:srgbClr val="9CDCFE"/>
+                </a:solidFill>
+                <a:latin typeface="Consolas" panose="020B0609020204030204" pitchFamily="49" charset="0"/>
+              </a:rPr>
+              <a:t>product</a:t>
+            </a:r>
+            <a:r>
+              <a:rPr lang="nl-NL" dirty="0">
+                <a:solidFill>
+                  <a:srgbClr val="D4D4D4"/>
+                </a:solidFill>
+                <a:latin typeface="Consolas" panose="020B0609020204030204" pitchFamily="49" charset="0"/>
+              </a:rPr>
+              <a:t>;</a:t>
+            </a:r>
+          </a:p>
+          <a:p>
+            <a:r>
+              <a:rPr lang="nl-NL" dirty="0">
+                <a:solidFill>
+                  <a:srgbClr val="D4D4D4"/>
+                </a:solidFill>
+                <a:latin typeface="Consolas" panose="020B0609020204030204" pitchFamily="49" charset="0"/>
+              </a:rPr>
+              <a:t>      </a:t>
+            </a:r>
+            <a:r>
+              <a:rPr lang="nl-NL" dirty="0">
+                <a:solidFill>
+                  <a:srgbClr val="C586C0"/>
+                </a:solidFill>
+                <a:latin typeface="Consolas" panose="020B0609020204030204" pitchFamily="49" charset="0"/>
+              </a:rPr>
+              <a:t>return</a:t>
+            </a:r>
+            <a:r>
+              <a:rPr lang="nl-NL" dirty="0">
+                <a:solidFill>
+                  <a:srgbClr val="D4D4D4"/>
+                </a:solidFill>
+                <a:latin typeface="Consolas" panose="020B0609020204030204" pitchFamily="49" charset="0"/>
+              </a:rPr>
+              <a:t> </a:t>
+            </a:r>
+            <a:r>
+              <a:rPr lang="nl-NL" dirty="0" err="1">
+                <a:solidFill>
+                  <a:srgbClr val="9CDCFE"/>
+                </a:solidFill>
+                <a:latin typeface="Consolas" panose="020B0609020204030204" pitchFamily="49" charset="0"/>
+              </a:rPr>
+              <a:t>aggregation</a:t>
+            </a:r>
+            <a:r>
+              <a:rPr lang="nl-NL" dirty="0">
+                <a:solidFill>
+                  <a:srgbClr val="D4D4D4"/>
+                </a:solidFill>
+                <a:latin typeface="Consolas" panose="020B0609020204030204" pitchFamily="49" charset="0"/>
+              </a:rPr>
+              <a:t>;</a:t>
+            </a:r>
+          </a:p>
+          <a:p>
+            <a:r>
+              <a:rPr lang="nl-NL" dirty="0">
+                <a:solidFill>
+                  <a:srgbClr val="D4D4D4"/>
+                </a:solidFill>
+                <a:latin typeface="Consolas" panose="020B0609020204030204" pitchFamily="49" charset="0"/>
+              </a:rPr>
+              <a:t>    }, {});</a:t>
+            </a:r>
+          </a:p>
+          <a:p>
+            <a:br>
+              <a:rPr lang="nl-NL" dirty="0">
+                <a:solidFill>
+                  <a:srgbClr val="D4D4D4"/>
+                </a:solidFill>
+                <a:latin typeface="Consolas" panose="020B0609020204030204" pitchFamily="49" charset="0"/>
+              </a:rPr>
+            </a:br>
+            <a:r>
+              <a:rPr lang="nl-NL" dirty="0">
+                <a:solidFill>
+                  <a:srgbClr val="D4D4D4"/>
+                </a:solidFill>
+                <a:latin typeface="Consolas" panose="020B0609020204030204" pitchFamily="49" charset="0"/>
+              </a:rPr>
+              <a:t>    </a:t>
+            </a:r>
+            <a:r>
+              <a:rPr lang="nl-NL" dirty="0">
+                <a:solidFill>
+                  <a:srgbClr val="C586C0"/>
+                </a:solidFill>
+                <a:latin typeface="Consolas" panose="020B0609020204030204" pitchFamily="49" charset="0"/>
+              </a:rPr>
+              <a:t>return</a:t>
+            </a:r>
+            <a:r>
+              <a:rPr lang="nl-NL" dirty="0">
+                <a:solidFill>
+                  <a:srgbClr val="D4D4D4"/>
+                </a:solidFill>
+                <a:latin typeface="Consolas" panose="020B0609020204030204" pitchFamily="49" charset="0"/>
+              </a:rPr>
+              <a:t> </a:t>
+            </a:r>
+            <a:r>
+              <a:rPr lang="nl-NL" dirty="0" err="1">
+                <a:solidFill>
+                  <a:srgbClr val="4FC1FF"/>
+                </a:solidFill>
+                <a:latin typeface="Consolas" panose="020B0609020204030204" pitchFamily="49" charset="0"/>
+              </a:rPr>
+              <a:t>updatedState</a:t>
+            </a:r>
+            <a:r>
+              <a:rPr lang="nl-NL" dirty="0">
+                <a:solidFill>
+                  <a:srgbClr val="D4D4D4"/>
+                </a:solidFill>
+                <a:latin typeface="Consolas" panose="020B0609020204030204" pitchFamily="49" charset="0"/>
+              </a:rPr>
+              <a:t>;</a:t>
+            </a:r>
+          </a:p>
+          <a:p>
+            <a:r>
+              <a:rPr lang="nl-NL" dirty="0">
+                <a:solidFill>
+                  <a:srgbClr val="D4D4D4"/>
+                </a:solidFill>
+                <a:latin typeface="Consolas" panose="020B0609020204030204" pitchFamily="49" charset="0"/>
+              </a:rPr>
+              <a:t>  }),</a:t>
+            </a:r>
+          </a:p>
+          <a:p>
+            <a:r>
+              <a:rPr lang="nl-NL" dirty="0">
+                <a:solidFill>
+                  <a:srgbClr val="D4D4D4"/>
+                </a:solidFill>
+                <a:latin typeface="Consolas" panose="020B0609020204030204" pitchFamily="49" charset="0"/>
+              </a:rPr>
+              <a:t>);</a:t>
+            </a:r>
+            <a:endParaRPr lang="nl-NL" b="0" dirty="0">
+              <a:solidFill>
+                <a:srgbClr val="D4D4D4"/>
+              </a:solidFill>
+              <a:effectLst/>
+              <a:latin typeface="Consolas" panose="020B0609020204030204" pitchFamily="49" charset="0"/>
+            </a:endParaRPr>
+          </a:p>
+        </p:txBody>
+      </p:sp>
+    </p:spTree>
+    <p:extLst>
+      <p:ext uri="{BB962C8B-B14F-4D97-AF65-F5344CB8AC3E}">
+        <p14:creationId xmlns:p14="http://schemas.microsoft.com/office/powerpoint/2010/main" val="611842311"/>
+      </p:ext>
+    </p:extLst>
+  </p:cSld>
+  <p:clrMapOvr>
+    <a:masterClrMapping/>
+  </p:clrMapOvr>
+</p:sld>
+</file>
+
+<file path=ppt/slides/slide14.xml><?xml version="1.0" encoding="utf-8"?>
+<p:sld xmlns:a="http://schemas.openxmlformats.org/drawingml/2006/main" xmlns:r="http://schemas.openxmlformats.org/officeDocument/2006/relationships" xmlns:p="http://schemas.openxmlformats.org/presentationml/2006/main">
+  <p:cSld>
+    <p:spTree>
+      <p:nvGrpSpPr>
+        <p:cNvPr id="1" name=""/>
+        <p:cNvGrpSpPr/>
+        <p:nvPr/>
+      </p:nvGrpSpPr>
+      <p:grpSpPr>
+        <a:xfrm>
+          <a:off x="0" y="0"/>
+          <a:ext cx="0" cy="0"/>
+          <a:chOff x="0" y="0"/>
+          <a:chExt cx="0" cy="0"/>
+        </a:xfrm>
+      </p:grpSpPr>
+      <p:sp>
+        <p:nvSpPr>
+          <p:cNvPr id="2" name="Title 1">
+            <a:extLst>
+              <a:ext uri="{FF2B5EF4-FFF2-40B4-BE49-F238E27FC236}">
+                <a16:creationId xmlns:a16="http://schemas.microsoft.com/office/drawing/2014/main" id="{58A75D02-8D99-4750-B95C-655E0DA90887}"/>
+              </a:ext>
+            </a:extLst>
+          </p:cNvPr>
+          <p:cNvSpPr>
+            <a:spLocks noGrp="1"/>
+          </p:cNvSpPr>
+          <p:nvPr>
+            <p:ph type="title"/>
+          </p:nvPr>
+        </p:nvSpPr>
+        <p:spPr/>
+        <p:txBody>
+          <a:bodyPr/>
+          <a:lstStyle/>
+          <a:p>
+            <a:r>
+              <a:rPr lang="en-US" dirty="0"/>
+              <a:t>NGRX - Selector</a:t>
+            </a:r>
+            <a:endParaRPr lang="nl-NL" dirty="0"/>
+          </a:p>
+        </p:txBody>
+      </p:sp>
+      <p:sp>
+        <p:nvSpPr>
+          <p:cNvPr id="5" name="Rectangle 4">
+            <a:extLst>
+              <a:ext uri="{FF2B5EF4-FFF2-40B4-BE49-F238E27FC236}">
+                <a16:creationId xmlns:a16="http://schemas.microsoft.com/office/drawing/2014/main" id="{73980856-458A-48A9-A882-1BF4B3A5EE72}"/>
+              </a:ext>
+            </a:extLst>
+          </p:cNvPr>
+          <p:cNvSpPr/>
+          <p:nvPr/>
+        </p:nvSpPr>
+        <p:spPr>
+          <a:xfrm>
+            <a:off x="1437600" y="2214694"/>
+            <a:ext cx="9316800" cy="2308324"/>
+          </a:xfrm>
+          <a:prstGeom prst="rect">
+            <a:avLst/>
+          </a:prstGeom>
+          <a:solidFill>
+            <a:schemeClr val="tx1"/>
+          </a:solidFill>
+        </p:spPr>
+        <p:txBody>
+          <a:bodyPr wrap="square">
+            <a:spAutoFit/>
+          </a:bodyPr>
+          <a:lstStyle/>
+          <a:p>
+            <a:r>
+              <a:rPr lang="nl-NL" dirty="0">
+                <a:solidFill>
+                  <a:srgbClr val="C586C0"/>
+                </a:solidFill>
+                <a:latin typeface="Consolas" panose="020B0609020204030204" pitchFamily="49" charset="0"/>
+              </a:rPr>
+              <a:t>export</a:t>
+            </a:r>
+            <a:r>
+              <a:rPr lang="nl-NL" dirty="0">
+                <a:solidFill>
+                  <a:srgbClr val="D4D4D4"/>
+                </a:solidFill>
+                <a:latin typeface="Consolas" panose="020B0609020204030204" pitchFamily="49" charset="0"/>
+              </a:rPr>
+              <a:t> </a:t>
+            </a:r>
+            <a:r>
+              <a:rPr lang="nl-NL" dirty="0" err="1">
+                <a:solidFill>
+                  <a:srgbClr val="569CD6"/>
+                </a:solidFill>
+                <a:latin typeface="Consolas" panose="020B0609020204030204" pitchFamily="49" charset="0"/>
+              </a:rPr>
+              <a:t>const</a:t>
+            </a:r>
+            <a:r>
+              <a:rPr lang="nl-NL" dirty="0">
+                <a:solidFill>
+                  <a:srgbClr val="D4D4D4"/>
+                </a:solidFill>
+                <a:latin typeface="Consolas" panose="020B0609020204030204" pitchFamily="49" charset="0"/>
+              </a:rPr>
+              <a:t> </a:t>
+            </a:r>
+            <a:r>
+              <a:rPr lang="nl-NL" dirty="0" err="1">
+                <a:solidFill>
+                  <a:srgbClr val="DCDCAA"/>
+                </a:solidFill>
+                <a:latin typeface="Consolas" panose="020B0609020204030204" pitchFamily="49" charset="0"/>
+              </a:rPr>
+              <a:t>selectShopFeature</a:t>
+            </a:r>
+            <a:r>
+              <a:rPr lang="nl-NL" dirty="0">
+                <a:solidFill>
+                  <a:srgbClr val="D4D4D4"/>
+                </a:solidFill>
+                <a:latin typeface="Consolas" panose="020B0609020204030204" pitchFamily="49" charset="0"/>
+              </a:rPr>
+              <a:t> = (</a:t>
+            </a:r>
+            <a:r>
+              <a:rPr lang="nl-NL" dirty="0">
+                <a:solidFill>
+                  <a:srgbClr val="9CDCFE"/>
+                </a:solidFill>
+                <a:latin typeface="Consolas" panose="020B0609020204030204" pitchFamily="49" charset="0"/>
+              </a:rPr>
+              <a:t>state</a:t>
+            </a:r>
+            <a:r>
+              <a:rPr lang="nl-NL" dirty="0">
+                <a:solidFill>
+                  <a:srgbClr val="D4D4D4"/>
+                </a:solidFill>
+                <a:latin typeface="Consolas" panose="020B0609020204030204" pitchFamily="49" charset="0"/>
+              </a:rPr>
+              <a:t>: </a:t>
+            </a:r>
+            <a:r>
+              <a:rPr lang="nl-NL" dirty="0" err="1">
+                <a:solidFill>
+                  <a:srgbClr val="4EC9B0"/>
+                </a:solidFill>
+                <a:latin typeface="Consolas" panose="020B0609020204030204" pitchFamily="49" charset="0"/>
+              </a:rPr>
+              <a:t>AppState</a:t>
+            </a:r>
+            <a:r>
+              <a:rPr lang="nl-NL" dirty="0">
+                <a:solidFill>
+                  <a:srgbClr val="D4D4D4"/>
+                </a:solidFill>
+                <a:latin typeface="Consolas" panose="020B0609020204030204" pitchFamily="49" charset="0"/>
+              </a:rPr>
+              <a:t>) </a:t>
+            </a:r>
+            <a:r>
+              <a:rPr lang="nl-NL" dirty="0">
+                <a:solidFill>
+                  <a:srgbClr val="569CD6"/>
+                </a:solidFill>
+                <a:latin typeface="Consolas" panose="020B0609020204030204" pitchFamily="49" charset="0"/>
+              </a:rPr>
+              <a:t>=&gt;</a:t>
+            </a:r>
+            <a:r>
+              <a:rPr lang="nl-NL" dirty="0">
+                <a:solidFill>
+                  <a:srgbClr val="D4D4D4"/>
+                </a:solidFill>
+                <a:latin typeface="Consolas" panose="020B0609020204030204" pitchFamily="49" charset="0"/>
+              </a:rPr>
+              <a:t> {</a:t>
+            </a:r>
+          </a:p>
+          <a:p>
+            <a:r>
+              <a:rPr lang="nl-NL" dirty="0">
+                <a:solidFill>
+                  <a:srgbClr val="D4D4D4"/>
+                </a:solidFill>
+                <a:latin typeface="Consolas" panose="020B0609020204030204" pitchFamily="49" charset="0"/>
+              </a:rPr>
+              <a:t>  </a:t>
+            </a:r>
+            <a:r>
+              <a:rPr lang="nl-NL" dirty="0">
+                <a:solidFill>
+                  <a:srgbClr val="C586C0"/>
+                </a:solidFill>
+                <a:latin typeface="Consolas" panose="020B0609020204030204" pitchFamily="49" charset="0"/>
+              </a:rPr>
+              <a:t>return</a:t>
+            </a:r>
+            <a:r>
+              <a:rPr lang="nl-NL" dirty="0">
+                <a:solidFill>
+                  <a:srgbClr val="D4D4D4"/>
+                </a:solidFill>
+                <a:latin typeface="Consolas" panose="020B0609020204030204" pitchFamily="49" charset="0"/>
+              </a:rPr>
+              <a:t> </a:t>
+            </a:r>
+            <a:r>
+              <a:rPr lang="nl-NL" dirty="0" err="1">
+                <a:solidFill>
+                  <a:srgbClr val="9CDCFE"/>
+                </a:solidFill>
+                <a:latin typeface="Consolas" panose="020B0609020204030204" pitchFamily="49" charset="0"/>
+              </a:rPr>
+              <a:t>state</a:t>
+            </a:r>
+            <a:r>
+              <a:rPr lang="nl-NL" dirty="0" err="1">
+                <a:solidFill>
+                  <a:srgbClr val="D4D4D4"/>
+                </a:solidFill>
+                <a:latin typeface="Consolas" panose="020B0609020204030204" pitchFamily="49" charset="0"/>
+              </a:rPr>
+              <a:t>.</a:t>
+            </a:r>
+            <a:r>
+              <a:rPr lang="nl-NL" dirty="0" err="1">
+                <a:solidFill>
+                  <a:srgbClr val="9CDCFE"/>
+                </a:solidFill>
+                <a:latin typeface="Consolas" panose="020B0609020204030204" pitchFamily="49" charset="0"/>
+              </a:rPr>
+              <a:t>shop</a:t>
+            </a:r>
+            <a:r>
+              <a:rPr lang="nl-NL" dirty="0">
+                <a:solidFill>
+                  <a:srgbClr val="D4D4D4"/>
+                </a:solidFill>
+                <a:latin typeface="Consolas" panose="020B0609020204030204" pitchFamily="49" charset="0"/>
+              </a:rPr>
+              <a:t>;</a:t>
+            </a:r>
+          </a:p>
+          <a:p>
+            <a:r>
+              <a:rPr lang="nl-NL" dirty="0">
+                <a:solidFill>
+                  <a:srgbClr val="D4D4D4"/>
+                </a:solidFill>
+                <a:latin typeface="Consolas" panose="020B0609020204030204" pitchFamily="49" charset="0"/>
+              </a:rPr>
+              <a:t>};</a:t>
+            </a:r>
+          </a:p>
+          <a:p>
+            <a:br>
+              <a:rPr lang="nl-NL" dirty="0">
+                <a:solidFill>
+                  <a:srgbClr val="D4D4D4"/>
+                </a:solidFill>
+                <a:latin typeface="Consolas" panose="020B0609020204030204" pitchFamily="49" charset="0"/>
+              </a:rPr>
+            </a:br>
+            <a:r>
+              <a:rPr lang="nl-NL" dirty="0">
+                <a:solidFill>
+                  <a:srgbClr val="C586C0"/>
+                </a:solidFill>
+                <a:latin typeface="Consolas" panose="020B0609020204030204" pitchFamily="49" charset="0"/>
+              </a:rPr>
+              <a:t>export</a:t>
+            </a:r>
+            <a:r>
+              <a:rPr lang="nl-NL" dirty="0">
+                <a:solidFill>
+                  <a:srgbClr val="D4D4D4"/>
+                </a:solidFill>
+                <a:latin typeface="Consolas" panose="020B0609020204030204" pitchFamily="49" charset="0"/>
+              </a:rPr>
+              <a:t> </a:t>
+            </a:r>
+            <a:r>
+              <a:rPr lang="nl-NL" dirty="0" err="1">
+                <a:solidFill>
+                  <a:srgbClr val="569CD6"/>
+                </a:solidFill>
+                <a:latin typeface="Consolas" panose="020B0609020204030204" pitchFamily="49" charset="0"/>
+              </a:rPr>
+              <a:t>const</a:t>
+            </a:r>
+            <a:r>
+              <a:rPr lang="nl-NL" dirty="0">
+                <a:solidFill>
+                  <a:srgbClr val="D4D4D4"/>
+                </a:solidFill>
+                <a:latin typeface="Consolas" panose="020B0609020204030204" pitchFamily="49" charset="0"/>
+              </a:rPr>
+              <a:t> </a:t>
+            </a:r>
+            <a:r>
+              <a:rPr lang="nl-NL" dirty="0" err="1">
+                <a:solidFill>
+                  <a:srgbClr val="4FC1FF"/>
+                </a:solidFill>
+                <a:latin typeface="Consolas" panose="020B0609020204030204" pitchFamily="49" charset="0"/>
+              </a:rPr>
+              <a:t>selectProducts</a:t>
+            </a:r>
+            <a:r>
+              <a:rPr lang="nl-NL" dirty="0">
+                <a:solidFill>
+                  <a:srgbClr val="D4D4D4"/>
+                </a:solidFill>
+                <a:latin typeface="Consolas" panose="020B0609020204030204" pitchFamily="49" charset="0"/>
+              </a:rPr>
+              <a:t> = </a:t>
+            </a:r>
+            <a:r>
+              <a:rPr lang="nl-NL" dirty="0" err="1">
+                <a:solidFill>
+                  <a:srgbClr val="DCDCAA"/>
+                </a:solidFill>
+                <a:latin typeface="Consolas" panose="020B0609020204030204" pitchFamily="49" charset="0"/>
+              </a:rPr>
+              <a:t>createSelector</a:t>
+            </a:r>
+            <a:r>
+              <a:rPr lang="nl-NL" dirty="0">
+                <a:solidFill>
+                  <a:srgbClr val="D4D4D4"/>
+                </a:solidFill>
+                <a:latin typeface="Consolas" panose="020B0609020204030204" pitchFamily="49" charset="0"/>
+              </a:rPr>
+              <a:t>(</a:t>
+            </a:r>
+          </a:p>
+          <a:p>
+            <a:r>
+              <a:rPr lang="nl-NL" dirty="0">
+                <a:solidFill>
+                  <a:srgbClr val="D4D4D4"/>
+                </a:solidFill>
+                <a:latin typeface="Consolas" panose="020B0609020204030204" pitchFamily="49" charset="0"/>
+              </a:rPr>
+              <a:t>  </a:t>
+            </a:r>
+            <a:r>
+              <a:rPr lang="nl-NL" dirty="0" err="1">
+                <a:solidFill>
+                  <a:srgbClr val="DCDCAA"/>
+                </a:solidFill>
+                <a:latin typeface="Consolas" panose="020B0609020204030204" pitchFamily="49" charset="0"/>
+              </a:rPr>
+              <a:t>selectShopFeature</a:t>
+            </a:r>
+            <a:r>
+              <a:rPr lang="nl-NL" dirty="0">
+                <a:solidFill>
+                  <a:srgbClr val="D4D4D4"/>
+                </a:solidFill>
+                <a:latin typeface="Consolas" panose="020B0609020204030204" pitchFamily="49" charset="0"/>
+              </a:rPr>
+              <a:t>,</a:t>
+            </a:r>
+          </a:p>
+          <a:p>
+            <a:r>
+              <a:rPr lang="nl-NL" dirty="0">
+                <a:solidFill>
+                  <a:srgbClr val="D4D4D4"/>
+                </a:solidFill>
+                <a:latin typeface="Consolas" panose="020B0609020204030204" pitchFamily="49" charset="0"/>
+              </a:rPr>
+              <a:t>  (</a:t>
+            </a:r>
+            <a:r>
+              <a:rPr lang="nl-NL" dirty="0" err="1">
+                <a:solidFill>
+                  <a:srgbClr val="9CDCFE"/>
+                </a:solidFill>
+                <a:latin typeface="Consolas" panose="020B0609020204030204" pitchFamily="49" charset="0"/>
+              </a:rPr>
+              <a:t>shopState</a:t>
+            </a:r>
+            <a:r>
+              <a:rPr lang="nl-NL" dirty="0">
+                <a:solidFill>
+                  <a:srgbClr val="D4D4D4"/>
+                </a:solidFill>
+                <a:latin typeface="Consolas" panose="020B0609020204030204" pitchFamily="49" charset="0"/>
+              </a:rPr>
+              <a:t>: </a:t>
+            </a:r>
+            <a:r>
+              <a:rPr lang="nl-NL" dirty="0" err="1">
+                <a:solidFill>
+                  <a:srgbClr val="4EC9B0"/>
+                </a:solidFill>
+                <a:latin typeface="Consolas" panose="020B0609020204030204" pitchFamily="49" charset="0"/>
+              </a:rPr>
+              <a:t>ShopState</a:t>
+            </a:r>
+            <a:r>
+              <a:rPr lang="nl-NL" dirty="0">
+                <a:solidFill>
+                  <a:srgbClr val="D4D4D4"/>
+                </a:solidFill>
+                <a:latin typeface="Consolas" panose="020B0609020204030204" pitchFamily="49" charset="0"/>
+              </a:rPr>
+              <a:t>) </a:t>
+            </a:r>
+            <a:r>
+              <a:rPr lang="nl-NL" dirty="0">
+                <a:solidFill>
+                  <a:srgbClr val="569CD6"/>
+                </a:solidFill>
+                <a:latin typeface="Consolas" panose="020B0609020204030204" pitchFamily="49" charset="0"/>
+              </a:rPr>
+              <a:t>=&gt;</a:t>
+            </a:r>
+            <a:r>
+              <a:rPr lang="nl-NL" dirty="0">
+                <a:solidFill>
+                  <a:srgbClr val="D4D4D4"/>
+                </a:solidFill>
+                <a:latin typeface="Consolas" panose="020B0609020204030204" pitchFamily="49" charset="0"/>
+              </a:rPr>
+              <a:t> </a:t>
+            </a:r>
+            <a:r>
+              <a:rPr lang="nl-NL" dirty="0" err="1">
+                <a:solidFill>
+                  <a:srgbClr val="4EC9B0"/>
+                </a:solidFill>
+                <a:latin typeface="Consolas" panose="020B0609020204030204" pitchFamily="49" charset="0"/>
+              </a:rPr>
+              <a:t>Object</a:t>
+            </a:r>
+            <a:r>
+              <a:rPr lang="nl-NL" dirty="0" err="1">
+                <a:solidFill>
+                  <a:srgbClr val="D4D4D4"/>
+                </a:solidFill>
+                <a:latin typeface="Consolas" panose="020B0609020204030204" pitchFamily="49" charset="0"/>
+              </a:rPr>
+              <a:t>.</a:t>
+            </a:r>
+            <a:r>
+              <a:rPr lang="nl-NL" dirty="0" err="1">
+                <a:solidFill>
+                  <a:srgbClr val="DCDCAA"/>
+                </a:solidFill>
+                <a:latin typeface="Consolas" panose="020B0609020204030204" pitchFamily="49" charset="0"/>
+              </a:rPr>
+              <a:t>values</a:t>
+            </a:r>
+            <a:r>
+              <a:rPr lang="nl-NL" dirty="0">
+                <a:solidFill>
+                  <a:srgbClr val="D4D4D4"/>
+                </a:solidFill>
+                <a:latin typeface="Consolas" panose="020B0609020204030204" pitchFamily="49" charset="0"/>
+              </a:rPr>
+              <a:t>(</a:t>
+            </a:r>
+            <a:r>
+              <a:rPr lang="nl-NL" dirty="0" err="1">
+                <a:solidFill>
+                  <a:srgbClr val="9CDCFE"/>
+                </a:solidFill>
+                <a:latin typeface="Consolas" panose="020B0609020204030204" pitchFamily="49" charset="0"/>
+              </a:rPr>
+              <a:t>shopState</a:t>
+            </a:r>
+            <a:r>
+              <a:rPr lang="nl-NL" dirty="0" err="1">
+                <a:solidFill>
+                  <a:srgbClr val="D4D4D4"/>
+                </a:solidFill>
+                <a:latin typeface="Consolas" panose="020B0609020204030204" pitchFamily="49" charset="0"/>
+              </a:rPr>
+              <a:t>.</a:t>
+            </a:r>
+            <a:r>
+              <a:rPr lang="nl-NL" dirty="0" err="1">
+                <a:solidFill>
+                  <a:srgbClr val="9CDCFE"/>
+                </a:solidFill>
+                <a:latin typeface="Consolas" panose="020B0609020204030204" pitchFamily="49" charset="0"/>
+              </a:rPr>
+              <a:t>products</a:t>
+            </a:r>
+            <a:r>
+              <a:rPr lang="nl-NL" dirty="0">
+                <a:solidFill>
+                  <a:srgbClr val="D4D4D4"/>
+                </a:solidFill>
+                <a:latin typeface="Consolas" panose="020B0609020204030204" pitchFamily="49" charset="0"/>
+              </a:rPr>
+              <a:t>)</a:t>
+            </a:r>
+          </a:p>
+          <a:p>
+            <a:r>
+              <a:rPr lang="nl-NL" dirty="0">
+                <a:solidFill>
+                  <a:srgbClr val="D4D4D4"/>
+                </a:solidFill>
+                <a:latin typeface="Consolas" panose="020B0609020204030204" pitchFamily="49" charset="0"/>
+              </a:rPr>
+              <a:t>);</a:t>
+            </a:r>
+            <a:endParaRPr lang="nl-NL" b="0" dirty="0">
+              <a:solidFill>
+                <a:srgbClr val="D4D4D4"/>
+              </a:solidFill>
+              <a:effectLst/>
+              <a:latin typeface="Consolas" panose="020B0609020204030204" pitchFamily="49" charset="0"/>
+            </a:endParaRPr>
+          </a:p>
+        </p:txBody>
+      </p:sp>
+    </p:spTree>
+    <p:extLst>
+      <p:ext uri="{BB962C8B-B14F-4D97-AF65-F5344CB8AC3E}">
+        <p14:creationId xmlns:p14="http://schemas.microsoft.com/office/powerpoint/2010/main" val="756728570"/>
+      </p:ext>
+    </p:extLst>
+  </p:cSld>
+  <p:clrMapOvr>
+    <a:masterClrMapping/>
+  </p:clrMapOvr>
+</p:sld>
+</file>
+
+<file path=ppt/slides/slide15.xml><?xml version="1.0" encoding="utf-8"?>
+<p:sld xmlns:a="http://schemas.openxmlformats.org/drawingml/2006/main" xmlns:r="http://schemas.openxmlformats.org/officeDocument/2006/relationships" xmlns:p="http://schemas.openxmlformats.org/presentationml/2006/main">
+  <p:cSld>
+    <p:spTree>
+      <p:nvGrpSpPr>
+        <p:cNvPr id="1" name=""/>
+        <p:cNvGrpSpPr/>
+        <p:nvPr/>
+      </p:nvGrpSpPr>
+      <p:grpSpPr>
+        <a:xfrm>
+          <a:off x="0" y="0"/>
+          <a:ext cx="0" cy="0"/>
+          <a:chOff x="0" y="0"/>
+          <a:chExt cx="0" cy="0"/>
+        </a:xfrm>
+      </p:grpSpPr>
+      <p:sp>
+        <p:nvSpPr>
+          <p:cNvPr id="2" name="Title 1">
+            <a:extLst>
+              <a:ext uri="{FF2B5EF4-FFF2-40B4-BE49-F238E27FC236}">
+                <a16:creationId xmlns:a16="http://schemas.microsoft.com/office/drawing/2014/main" id="{58A75D02-8D99-4750-B95C-655E0DA90887}"/>
+              </a:ext>
+            </a:extLst>
+          </p:cNvPr>
+          <p:cNvSpPr>
+            <a:spLocks noGrp="1"/>
+          </p:cNvSpPr>
+          <p:nvPr>
+            <p:ph type="title"/>
+          </p:nvPr>
+        </p:nvSpPr>
+        <p:spPr/>
+        <p:txBody>
+          <a:bodyPr/>
+          <a:lstStyle/>
+          <a:p>
+            <a:r>
+              <a:rPr lang="en-US" dirty="0"/>
               <a:t>NGRX – trade-offs</a:t>
             </a:r>
             <a:endParaRPr lang="nl-NL" dirty="0"/>
@@ -10975,7 +13326,7 @@
 </p:sld>
 </file>
 
-<file path=ppt/slides/slide12.xml><?xml version="1.0" encoding="utf-8"?>
+<file path=ppt/slides/slide16.xml><?xml version="1.0" encoding="utf-8"?>
 <p:sld xmlns:a="http://schemas.openxmlformats.org/drawingml/2006/main" xmlns:r="http://schemas.openxmlformats.org/officeDocument/2006/relationships" xmlns:p="http://schemas.openxmlformats.org/presentationml/2006/main">
   <p:cSld>
     <p:spTree>

</xml_diff>